<commit_message>
update documents -- added one extra user story
</commit_message>
<xml_diff>
--- a/End/User Stories for webpage.pptx
+++ b/End/User Stories for webpage.pptx
@@ -24,6 +24,7 @@
     <p:sldId id="269" r:id="rId18"/>
     <p:sldId id="270" r:id="rId19"/>
     <p:sldId id="271" r:id="rId20"/>
+    <p:sldId id="272" r:id="rId21"/>
   </p:sldIdLst>
   <p:sldSz cy="6858000" cx="9906000"/>
   <p:notesSz cx="6858000" cy="9144000"/>
@@ -1006,7 +1007,7 @@
   <p:cSld>
     <p:spTree>
       <p:nvGrpSpPr>
-        <p:cNvPr id="225" name="Shape 225"/>
+        <p:cNvPr id="224" name="Shape 224"/>
         <p:cNvGrpSpPr/>
         <p:nvPr/>
       </p:nvGrpSpPr>
@@ -1020,7 +1021,7 @@
       </p:grpSpPr>
       <p:sp>
         <p:nvSpPr>
-          <p:cNvPr id="226" name="Shape 226"/>
+          <p:cNvPr id="225" name="Shape 225"/>
           <p:cNvSpPr txBox="1"/>
           <p:nvPr>
             <p:ph idx="1" type="body"/>
@@ -1060,7 +1061,7 @@
       </p:sp>
       <p:sp>
         <p:nvSpPr>
-          <p:cNvPr id="227" name="Shape 227"/>
+          <p:cNvPr id="226" name="Shape 226"/>
           <p:cNvSpPr/>
           <p:nvPr>
             <p:ph idx="2" type="sldImg"/>
@@ -1160,6 +1161,105 @@
       <p:sp>
         <p:nvSpPr>
           <p:cNvPr id="238" name="Shape 238"/>
+          <p:cNvSpPr/>
+          <p:nvPr>
+            <p:ph idx="2" type="sldImg"/>
+          </p:nvPr>
+        </p:nvSpPr>
+        <p:spPr>
+          <a:xfrm>
+            <a:off x="1143225" y="685800"/>
+            <a:ext cx="4572300" cy="3429000"/>
+          </a:xfrm>
+          <a:custGeom>
+            <a:pathLst>
+              <a:path extrusionOk="0" h="120000" w="120000">
+                <a:moveTo>
+                  <a:pt x="0" y="0"/>
+                </a:moveTo>
+                <a:lnTo>
+                  <a:pt x="120000" y="0"/>
+                </a:lnTo>
+                <a:lnTo>
+                  <a:pt x="120000" y="120000"/>
+                </a:lnTo>
+                <a:lnTo>
+                  <a:pt x="0" y="120000"/>
+                </a:lnTo>
+                <a:close/>
+              </a:path>
+            </a:pathLst>
+          </a:custGeom>
+        </p:spPr>
+      </p:sp>
+    </p:spTree>
+  </p:cSld>
+  <p:clrMapOvr>
+    <a:masterClrMapping/>
+  </p:clrMapOvr>
+</p:notes>
+</file>
+
+<file path=ppt/notesSlides/notesSlide17.xml><?xml version="1.0" encoding="utf-8"?>
+<p:notes xmlns:a="http://schemas.openxmlformats.org/drawingml/2006/main" xmlns:r="http://schemas.openxmlformats.org/officeDocument/2006/relationships" xmlns:mc="http://schemas.openxmlformats.org/markup-compatibility/2006" xmlns:mv="urn:schemas-microsoft-com:mac:vml" xmlns:p="http://schemas.openxmlformats.org/presentationml/2006/main" xmlns:c="http://schemas.openxmlformats.org/drawingml/2006/chart" xmlns:dgm="http://schemas.openxmlformats.org/drawingml/2006/diagram" xmlns:o="urn:schemas-microsoft-com:office:office" xmlns:v="urn:schemas-microsoft-com:vml" xmlns:pvml="urn:schemas-microsoft-com:office:powerpoint" xmlns:com="http://schemas.openxmlformats.org/drawingml/2006/compatibility" xmlns:p14="http://schemas.microsoft.com/office/powerpoint/2010/main" xmlns:p15="http://schemas.microsoft.com/office/powerpoint/2012/main" showMasterPhAnim="0" showMasterSp="0">
+  <p:cSld>
+    <p:spTree>
+      <p:nvGrpSpPr>
+        <p:cNvPr id="247" name="Shape 247"/>
+        <p:cNvGrpSpPr/>
+        <p:nvPr/>
+      </p:nvGrpSpPr>
+      <p:grpSpPr>
+        <a:xfrm>
+          <a:off x="0" y="0"/>
+          <a:ext cx="0" cy="0"/>
+          <a:chOff x="0" y="0"/>
+          <a:chExt cx="0" cy="0"/>
+        </a:xfrm>
+      </p:grpSpPr>
+      <p:sp>
+        <p:nvSpPr>
+          <p:cNvPr id="248" name="Shape 248"/>
+          <p:cNvSpPr txBox="1"/>
+          <p:nvPr>
+            <p:ph idx="1" type="body"/>
+          </p:nvPr>
+        </p:nvSpPr>
+        <p:spPr>
+          <a:xfrm>
+            <a:off x="685800" y="4343400"/>
+            <a:ext cx="5486400" cy="4114800"/>
+          </a:xfrm>
+          <a:prstGeom prst="rect">
+            <a:avLst/>
+          </a:prstGeom>
+          <a:noFill/>
+          <a:ln>
+            <a:noFill/>
+          </a:ln>
+        </p:spPr>
+        <p:txBody>
+          <a:bodyPr anchorCtr="0" anchor="ctr" bIns="91425" lIns="91425" rIns="91425" wrap="square" tIns="91425">
+            <a:noAutofit/>
+          </a:bodyPr>
+          <a:lstStyle/>
+          <a:p>
+            <a:pPr lvl="0" rtl="0">
+              <a:spcBef>
+                <a:spcPts val="0"/>
+              </a:spcBef>
+              <a:buNone/>
+            </a:pPr>
+            <a:r>
+              <a:t/>
+            </a:r>
+            <a:endParaRPr/>
+          </a:p>
+        </p:txBody>
+      </p:sp>
+      <p:sp>
+        <p:nvSpPr>
+          <p:cNvPr id="249" name="Shape 249"/>
           <p:cNvSpPr/>
           <p:nvPr>
             <p:ph idx="2" type="sldImg"/>
@@ -11933,7 +12033,7 @@
                 <a:cs typeface="Calibri"/>
                 <a:sym typeface="Calibri"/>
               </a:rPr>
-              <a:t>Story ID </a:t>
+              <a:t>Story ID S</a:t>
             </a:r>
             <a:r>
               <a:rPr lang="en-AU" sz="2000">
@@ -11945,7 +12045,7 @@
                 <a:cs typeface="Calibri"/>
                 <a:sym typeface="Calibri"/>
               </a:rPr>
-              <a:t>S2</a:t>
+              <a:t>1</a:t>
             </a:r>
           </a:p>
         </p:txBody>
@@ -12000,7 +12100,7 @@
                 <a:cs typeface="Calibri"/>
                 <a:sym typeface="Calibri"/>
               </a:rPr>
-              <a:t>City information webpages	</a:t>
+              <a:t>Home page</a:t>
             </a:r>
           </a:p>
         </p:txBody>
@@ -12055,7 +12155,7 @@
                 <a:cs typeface="Calibri"/>
                 <a:sym typeface="Calibri"/>
               </a:rPr>
-              <a:t>As a user, any information I access should have details of their name, address, number,</a:t>
+              <a:t>As a user, the home page to the website should </a:t>
             </a:r>
             <a:r>
               <a:rPr lang="en-AU" sz="2400">
@@ -12067,20 +12167,56 @@
                 <a:cs typeface="Calibri"/>
                 <a:sym typeface="Calibri"/>
               </a:rPr>
-              <a:t> type and email address.</a:t>
-            </a:r>
-          </a:p>
-          <a:p>
-            <a:pPr indent="0" lvl="0" marL="0" marR="0" rtl="0" algn="l">
-              <a:spcBef>
-                <a:spcPts val="0"/>
-              </a:spcBef>
-              <a:buNone/>
-            </a:pPr>
-            <a:r>
-              <a:t/>
-            </a:r>
-            <a:endParaRPr/>
+              <a:t>display relevant information </a:t>
+            </a:r>
+            <a:r>
+              <a:rPr b="0" i="0" lang="en-AU" sz="2400" u="none" cap="none" strike="noStrike">
+                <a:solidFill>
+                  <a:schemeClr val="dk1"/>
+                </a:solidFill>
+                <a:latin typeface="Calibri"/>
+                <a:ea typeface="Calibri"/>
+                <a:cs typeface="Calibri"/>
+                <a:sym typeface="Calibri"/>
+              </a:rPr>
+              <a:t>and </a:t>
+            </a:r>
+            <a:r>
+              <a:rPr lang="en-AU" sz="2400">
+                <a:solidFill>
+                  <a:schemeClr val="dk1"/>
+                </a:solidFill>
+                <a:latin typeface="Calibri"/>
+                <a:ea typeface="Calibri"/>
+                <a:cs typeface="Calibri"/>
+                <a:sym typeface="Calibri"/>
+              </a:rPr>
+              <a:t>is u</a:t>
+            </a:r>
+            <a:r>
+              <a:rPr b="0" i="0" lang="en-AU" sz="2400" u="none" cap="none" strike="noStrike">
+                <a:solidFill>
+                  <a:schemeClr val="dk1"/>
+                </a:solidFill>
+                <a:latin typeface="Calibri"/>
+                <a:ea typeface="Calibri"/>
+                <a:cs typeface="Calibri"/>
+                <a:sym typeface="Calibri"/>
+              </a:rPr>
+              <a:t>ser friendly so that </a:t>
+            </a:r>
+            <a:r>
+              <a:rPr lang="en-AU" sz="2400">
+                <a:solidFill>
+                  <a:schemeClr val="dk1"/>
+                </a:solidFill>
+                <a:latin typeface="Calibri"/>
+                <a:ea typeface="Calibri"/>
+                <a:cs typeface="Calibri"/>
+                <a:sym typeface="Calibri"/>
+              </a:rPr>
+              <a:t>I can navigate through the web page</a:t>
+            </a:r>
           </a:p>
         </p:txBody>
       </p:sp>
@@ -12103,7 +12239,7 @@
           </a:solidFill>
           <a:ln cap="flat" cmpd="sng" w="25400">
             <a:solidFill>
-              <a:srgbClr val="244061"/>
+              <a:srgbClr val="000000"/>
             </a:solidFill>
             <a:prstDash val="solid"/>
             <a:round/>
@@ -12146,7 +12282,7 @@
                 <a:schemeClr val="dk1"/>
               </a:buClr>
               <a:buSzPct val="100000"/>
-              <a:buFont typeface="Arial"/>
+              <a:buFont typeface="Calibri"/>
               <a:buChar char="•"/>
             </a:pPr>
             <a:r>
@@ -12159,7 +12295,7 @@
                 <a:cs typeface="Calibri"/>
                 <a:sym typeface="Calibri"/>
               </a:rPr>
-              <a:t>All information provided displayed on requested page</a:t>
+              <a:t>Button to create new account</a:t>
             </a:r>
           </a:p>
           <a:p>
@@ -12176,15 +12312,12 @@
             </a:pPr>
             <a:r>
               <a:rPr lang="en-AU" sz="2000">
-                <a:solidFill>
-                  <a:schemeClr val="dk1"/>
-                </a:solidFill>
-                <a:latin typeface="Calibri"/>
-                <a:ea typeface="Calibri"/>
-                <a:cs typeface="Calibri"/>
-                <a:sym typeface="Calibri"/>
-              </a:rPr>
-              <a:t>Accurate and updated regularly</a:t>
+                <a:latin typeface="Calibri"/>
+                <a:ea typeface="Calibri"/>
+                <a:cs typeface="Calibri"/>
+                <a:sym typeface="Calibri"/>
+              </a:rPr>
+              <a:t>All categories of information presented in tiled format</a:t>
             </a:r>
           </a:p>
         </p:txBody>
@@ -12300,7 +12433,7 @@
             </a:r>
           </a:p>
           <a:p>
-            <a:pPr indent="-166687" lvl="0" marL="179387" marR="0" rtl="0" algn="l">
+            <a:pPr indent="-179387" lvl="0" marL="179387" marR="0" rtl="0" algn="l">
               <a:spcBef>
                 <a:spcPts val="0"/>
               </a:spcBef>
@@ -12312,16 +12445,66 @@
               <a:buChar char="•"/>
             </a:pPr>
             <a:r>
-              <a:rPr lang="en-AU" sz="1800">
-                <a:solidFill>
-                  <a:schemeClr val="dk1"/>
-                </a:solidFill>
-                <a:latin typeface="Calibri"/>
-                <a:ea typeface="Calibri"/>
-                <a:cs typeface="Calibri"/>
-                <a:sym typeface="Calibri"/>
-              </a:rPr>
-              <a:t> Information is defined by city information, hotel, libraries, industries and colleges.</a:t>
+              <a:rPr lang="en-AU" sz="2000">
+                <a:solidFill>
+                  <a:schemeClr val="dk1"/>
+                </a:solidFill>
+                <a:latin typeface="Calibri"/>
+                <a:ea typeface="Calibri"/>
+                <a:cs typeface="Calibri"/>
+                <a:sym typeface="Calibri"/>
+              </a:rPr>
+              <a:t> Amazing design</a:t>
+            </a:r>
+          </a:p>
+          <a:p>
+            <a:pPr indent="-179387" lvl="0" marL="179387" marR="0" rtl="0" algn="l">
+              <a:spcBef>
+                <a:spcPts val="0"/>
+              </a:spcBef>
+              <a:buClr>
+                <a:schemeClr val="dk1"/>
+              </a:buClr>
+              <a:buSzPct val="100000"/>
+              <a:buFont typeface="Calibri"/>
+              <a:buChar char="•"/>
+            </a:pPr>
+            <a:r>
+              <a:rPr lang="en-AU" sz="2000">
+                <a:solidFill>
+                  <a:schemeClr val="dk1"/>
+                </a:solidFill>
+                <a:latin typeface="Calibri"/>
+                <a:ea typeface="Calibri"/>
+                <a:cs typeface="Calibri"/>
+                <a:sym typeface="Calibri"/>
+              </a:rPr>
+              <a:t>Logo</a:t>
+            </a:r>
+          </a:p>
+          <a:p>
+            <a:pPr indent="-179387" lvl="0" marL="179387" rtl="0">
+              <a:spcBef>
+                <a:spcPts val="0"/>
+              </a:spcBef>
+              <a:buClr>
+                <a:schemeClr val="dk1"/>
+              </a:buClr>
+              <a:buSzPct val="100000"/>
+              <a:buFont typeface="Calibri"/>
+              <a:buChar char="•"/>
+            </a:pPr>
+            <a:r>
+              <a:rPr lang="en-AU" sz="2000">
+                <a:solidFill>
+                  <a:schemeClr val="dk1"/>
+                </a:solidFill>
+                <a:latin typeface="Calibri"/>
+                <a:ea typeface="Calibri"/>
+                <a:cs typeface="Calibri"/>
+                <a:sym typeface="Calibri"/>
+              </a:rPr>
+              <a:t>Aesthetically pleasing to the eyes (font, colour, attractiveness)</a:t>
             </a:r>
           </a:p>
         </p:txBody>
@@ -12401,7 +12584,7 @@
                 <a:cs typeface="Calibri"/>
                 <a:sym typeface="Calibri"/>
               </a:rPr>
-              <a:t>Should Have</a:t>
+              <a:t>Must Have</a:t>
             </a:r>
           </a:p>
         </p:txBody>
@@ -12468,7 +12651,7 @@
                 <a:cs typeface="Calibri"/>
                 <a:sym typeface="Calibri"/>
               </a:rPr>
-              <a:t>S3</a:t>
+              <a:t>S2</a:t>
             </a:r>
           </a:p>
         </p:txBody>
@@ -12482,7 +12665,7 @@
         <p:spPr>
           <a:xfrm>
             <a:off x="831150" y="109400"/>
-            <a:ext cx="6636900" cy="540000"/>
+            <a:ext cx="6623100" cy="540000"/>
           </a:xfrm>
           <a:prstGeom prst="rect">
             <a:avLst/>
@@ -12523,7 +12706,7 @@
                 <a:cs typeface="Calibri"/>
                 <a:sym typeface="Calibri"/>
               </a:rPr>
-              <a:t>Uploading a map</a:t>
+              <a:t>City information webpages	</a:t>
             </a:r>
           </a:p>
         </p:txBody>
@@ -12578,7 +12761,7 @@
                 <a:cs typeface="Calibri"/>
                 <a:sym typeface="Calibri"/>
               </a:rPr>
-              <a:t>As a</a:t>
+              <a:t>As a user, any information I access should have details of their name, address, number,</a:t>
             </a:r>
             <a:r>
               <a:rPr lang="en-AU" sz="2400">
@@ -12590,8 +12773,20 @@
                 <a:cs typeface="Calibri"/>
                 <a:sym typeface="Calibri"/>
               </a:rPr>
-              <a:t>n admin, I should be able to upload a map of the city to the system so that people can see a map.</a:t>
-            </a:r>
+              <a:t> type and email address.</a:t>
+            </a:r>
+          </a:p>
+          <a:p>
+            <a:pPr indent="0" lvl="0" marL="0" marR="0" rtl="0" algn="l">
+              <a:spcBef>
+                <a:spcPts val="0"/>
+              </a:spcBef>
+              <a:buNone/>
+            </a:pPr>
+            <a:r>
+              <a:t/>
+            </a:r>
+            <a:endParaRPr/>
           </a:p>
         </p:txBody>
       </p:sp>
@@ -12657,7 +12852,7 @@
                 <a:schemeClr val="dk1"/>
               </a:buClr>
               <a:buSzPct val="100000"/>
-              <a:buFont typeface="Calibri"/>
+              <a:buFont typeface="Arial"/>
               <a:buChar char="•"/>
             </a:pPr>
             <a:r>
@@ -12670,7 +12865,7 @@
                 <a:cs typeface="Calibri"/>
                 <a:sym typeface="Calibri"/>
               </a:rPr>
-              <a:t>Map should show whole city in any information item page </a:t>
+              <a:t>All information provided displayed on requested page</a:t>
             </a:r>
           </a:p>
           <a:p>
@@ -12695,7 +12890,7 @@
                 <a:cs typeface="Calibri"/>
                 <a:sym typeface="Calibri"/>
               </a:rPr>
-              <a:t>Map can pinpoint individual or multiple locations from the category of information chosen</a:t>
+              <a:t>Accurate and updated regularly</a:t>
             </a:r>
           </a:p>
         </p:txBody>
@@ -12808,6 +13003,31 @@
                 <a:sym typeface="Calibri"/>
               </a:rPr>
               <a:t>Notes</a:t>
+            </a:r>
+          </a:p>
+          <a:p>
+            <a:pPr indent="-166687" lvl="0" marL="179387" marR="0" rtl="0" algn="l">
+              <a:spcBef>
+                <a:spcPts val="0"/>
+              </a:spcBef>
+              <a:buClr>
+                <a:schemeClr val="dk1"/>
+              </a:buClr>
+              <a:buSzPct val="100000"/>
+              <a:buFont typeface="Arial"/>
+              <a:buChar char="•"/>
+            </a:pPr>
+            <a:r>
+              <a:rPr lang="en-AU" sz="1800">
+                <a:solidFill>
+                  <a:schemeClr val="dk1"/>
+                </a:solidFill>
+                <a:latin typeface="Calibri"/>
+                <a:ea typeface="Calibri"/>
+                <a:cs typeface="Calibri"/>
+                <a:sym typeface="Calibri"/>
+              </a:rPr>
+              <a:t> Information is defined by city information, hotel, libraries, industries and colleges.</a:t>
             </a:r>
           </a:p>
         </p:txBody>
@@ -12887,19 +13107,7 @@
                 <a:cs typeface="Calibri"/>
                 <a:sym typeface="Calibri"/>
               </a:rPr>
-              <a:t>Could</a:t>
-            </a:r>
-            <a:r>
-              <a:rPr lang="en-AU" sz="2000">
-                <a:solidFill>
-                  <a:schemeClr val="dk1"/>
-                </a:solidFill>
-                <a:latin typeface="Calibri"/>
-                <a:ea typeface="Calibri"/>
-                <a:cs typeface="Calibri"/>
-                <a:sym typeface="Calibri"/>
-              </a:rPr>
-              <a:t> Have</a:t>
+              <a:t>Should Have</a:t>
             </a:r>
           </a:p>
         </p:txBody>
@@ -12941,26 +13149,6 @@
               <a:spcBef>
                 <a:spcPts val="0"/>
               </a:spcBef>
-              <a:buNone/>
-            </a:pPr>
-            <a:r>
-              <a:t/>
-            </a:r>
-            <a:endParaRPr sz="2000">
-              <a:solidFill>
-                <a:schemeClr val="dk1"/>
-              </a:solidFill>
-              <a:latin typeface="Calibri"/>
-              <a:ea typeface="Calibri"/>
-              <a:cs typeface="Calibri"/>
-              <a:sym typeface="Calibri"/>
-            </a:endParaRPr>
-          </a:p>
-          <a:p>
-            <a:pPr indent="0" lvl="0" marL="0" marR="0" rtl="0" algn="ctr">
-              <a:spcBef>
-                <a:spcPts val="0"/>
-              </a:spcBef>
               <a:buSzPct val="25000"/>
               <a:buNone/>
             </a:pPr>
@@ -12986,28 +13174,8 @@
                 <a:cs typeface="Calibri"/>
                 <a:sym typeface="Calibri"/>
               </a:rPr>
-              <a:t>O1</a:t>
-            </a:r>
-          </a:p>
-          <a:p>
-            <a:pPr indent="0" lvl="0" marL="0" marR="0" rtl="0" algn="ctr">
-              <a:spcBef>
-                <a:spcPts val="0"/>
-              </a:spcBef>
-              <a:buNone/>
-            </a:pPr>
-            <a:r>
-              <a:t/>
-            </a:r>
-            <a:endParaRPr sz="2000">
-              <a:solidFill>
-                <a:schemeClr val="dk1"/>
-              </a:solidFill>
-              <a:latin typeface="Calibri"/>
-              <a:ea typeface="Calibri"/>
-              <a:cs typeface="Calibri"/>
-              <a:sym typeface="Calibri"/>
-            </a:endParaRPr>
+              <a:t>S3</a:t>
+            </a:r>
           </a:p>
         </p:txBody>
       </p:sp>
@@ -13020,7 +13188,7 @@
         <p:spPr>
           <a:xfrm>
             <a:off x="831150" y="109400"/>
-            <a:ext cx="6623100" cy="540000"/>
+            <a:ext cx="6636900" cy="540000"/>
           </a:xfrm>
           <a:prstGeom prst="rect">
             <a:avLst/>
@@ -13061,7 +13229,7 @@
                 <a:cs typeface="Calibri"/>
                 <a:sym typeface="Calibri"/>
               </a:rPr>
-              <a:t>Favourites tool</a:t>
+              <a:t>Uploading a map</a:t>
             </a:r>
           </a:p>
         </p:txBody>
@@ -13116,7 +13284,7 @@
                 <a:cs typeface="Calibri"/>
                 <a:sym typeface="Calibri"/>
               </a:rPr>
-              <a:t>As a user, </a:t>
+              <a:t>As a</a:t>
             </a:r>
             <a:r>
               <a:rPr lang="en-AU" sz="2400">
@@ -13128,31 +13296,7 @@
                 <a:cs typeface="Calibri"/>
                 <a:sym typeface="Calibri"/>
               </a:rPr>
-              <a:t>I</a:t>
-            </a:r>
-            <a:r>
-              <a:rPr b="0" i="0" lang="en-AU" sz="2400" u="none" cap="none" strike="noStrike">
-                <a:solidFill>
-                  <a:schemeClr val="dk1"/>
-                </a:solidFill>
-                <a:latin typeface="Calibri"/>
-                <a:ea typeface="Calibri"/>
-                <a:cs typeface="Calibri"/>
-                <a:sym typeface="Calibri"/>
-              </a:rPr>
-              <a:t> want to be able to save my favourite information available from</a:t>
-            </a:r>
-            <a:r>
-              <a:rPr lang="en-AU" sz="2400">
-                <a:solidFill>
-                  <a:schemeClr val="dk1"/>
-                </a:solidFill>
-                <a:latin typeface="Calibri"/>
-                <a:ea typeface="Calibri"/>
-                <a:cs typeface="Calibri"/>
-                <a:sym typeface="Calibri"/>
-              </a:rPr>
-              <a:t> the website so that I can gain easy and quick access to it.</a:t>
+              <a:t>n admin, I should be able to upload a map of the city to the system so that people can see a map.</a:t>
             </a:r>
           </a:p>
         </p:txBody>
@@ -13219,7 +13363,7 @@
                 <a:schemeClr val="dk1"/>
               </a:buClr>
               <a:buSzPct val="100000"/>
-              <a:buFont typeface="Arial"/>
+              <a:buFont typeface="Calibri"/>
               <a:buChar char="•"/>
             </a:pPr>
             <a:r>
@@ -13232,7 +13376,7 @@
                 <a:cs typeface="Calibri"/>
                 <a:sym typeface="Calibri"/>
               </a:rPr>
-              <a:t>No duplication</a:t>
+              <a:t>Map should show whole city in any information item page </a:t>
             </a:r>
           </a:p>
           <a:p>
@@ -13257,32 +13401,7 @@
                 <a:cs typeface="Calibri"/>
                 <a:sym typeface="Calibri"/>
               </a:rPr>
-              <a:t>Able to favourite or bookmark specific web page in user account</a:t>
-            </a:r>
-          </a:p>
-          <a:p>
-            <a:pPr indent="-179387" lvl="0" marL="179387" marR="0" rtl="0" algn="l">
-              <a:spcBef>
-                <a:spcPts val="0"/>
-              </a:spcBef>
-              <a:buClr>
-                <a:schemeClr val="dk1"/>
-              </a:buClr>
-              <a:buSzPct val="100000"/>
-              <a:buFont typeface="Calibri"/>
-              <a:buChar char="•"/>
-            </a:pPr>
-            <a:r>
-              <a:rPr lang="en-AU" sz="2000">
-                <a:solidFill>
-                  <a:schemeClr val="dk1"/>
-                </a:solidFill>
-                <a:latin typeface="Calibri"/>
-                <a:ea typeface="Calibri"/>
-                <a:cs typeface="Calibri"/>
-                <a:sym typeface="Calibri"/>
-              </a:rPr>
-              <a:t>Easily accessible area to re-select bookmarked item</a:t>
+              <a:t>Map can pinpoint individual or multiple locations from the category of information chosen</a:t>
             </a:r>
           </a:p>
         </p:txBody>
@@ -13528,6 +13647,26 @@
               <a:spcBef>
                 <a:spcPts val="0"/>
               </a:spcBef>
+              <a:buNone/>
+            </a:pPr>
+            <a:r>
+              <a:t/>
+            </a:r>
+            <a:endParaRPr sz="2000">
+              <a:solidFill>
+                <a:schemeClr val="dk1"/>
+              </a:solidFill>
+              <a:latin typeface="Calibri"/>
+              <a:ea typeface="Calibri"/>
+              <a:cs typeface="Calibri"/>
+              <a:sym typeface="Calibri"/>
+            </a:endParaRPr>
+          </a:p>
+          <a:p>
+            <a:pPr indent="0" lvl="0" marL="0" marR="0" rtl="0" algn="ctr">
+              <a:spcBef>
+                <a:spcPts val="0"/>
+              </a:spcBef>
               <a:buSzPct val="25000"/>
               <a:buNone/>
             </a:pPr>
@@ -13541,7 +13680,7 @@
                 <a:cs typeface="Calibri"/>
                 <a:sym typeface="Calibri"/>
               </a:rPr>
-              <a:t>Story ID O</a:t>
+              <a:t>Story ID </a:t>
             </a:r>
             <a:r>
               <a:rPr lang="en-AU" sz="2000">
@@ -13553,8 +13692,28 @@
                 <a:cs typeface="Calibri"/>
                 <a:sym typeface="Calibri"/>
               </a:rPr>
-              <a:t>2</a:t>
-            </a:r>
+              <a:t>O1</a:t>
+            </a:r>
+          </a:p>
+          <a:p>
+            <a:pPr indent="0" lvl="0" marL="0" marR="0" rtl="0" algn="ctr">
+              <a:spcBef>
+                <a:spcPts val="0"/>
+              </a:spcBef>
+              <a:buNone/>
+            </a:pPr>
+            <a:r>
+              <a:t/>
+            </a:r>
+            <a:endParaRPr sz="2000">
+              <a:solidFill>
+                <a:schemeClr val="dk1"/>
+              </a:solidFill>
+              <a:latin typeface="Calibri"/>
+              <a:ea typeface="Calibri"/>
+              <a:cs typeface="Calibri"/>
+              <a:sym typeface="Calibri"/>
+            </a:endParaRPr>
           </a:p>
         </p:txBody>
       </p:sp>
@@ -13567,7 +13726,7 @@
         <p:spPr>
           <a:xfrm>
             <a:off x="831150" y="109400"/>
-            <a:ext cx="6646200" cy="540000"/>
+            <a:ext cx="6623100" cy="540000"/>
           </a:xfrm>
           <a:prstGeom prst="rect">
             <a:avLst/>
@@ -13608,7 +13767,7 @@
                 <a:cs typeface="Calibri"/>
                 <a:sym typeface="Calibri"/>
               </a:rPr>
-              <a:t>Language options</a:t>
+              <a:t>Favourites tool</a:t>
             </a:r>
           </a:p>
         </p:txBody>
@@ -13663,7 +13822,7 @@
                 <a:cs typeface="Calibri"/>
                 <a:sym typeface="Calibri"/>
               </a:rPr>
-              <a:t>As a </a:t>
+              <a:t>As a user, </a:t>
             </a:r>
             <a:r>
               <a:rPr lang="en-AU" sz="2400">
@@ -13675,7 +13834,7 @@
                 <a:cs typeface="Calibri"/>
                 <a:sym typeface="Calibri"/>
               </a:rPr>
-              <a:t>User</a:t>
+              <a:t>I</a:t>
             </a:r>
             <a:r>
               <a:rPr b="0" i="0" lang="en-AU" sz="2400" u="none" cap="none" strike="noStrike">
@@ -13687,7 +13846,7 @@
                 <a:cs typeface="Calibri"/>
                 <a:sym typeface="Calibri"/>
               </a:rPr>
-              <a:t> I want </a:t>
+              <a:t> want to be able to save my favourite information available from</a:t>
             </a:r>
             <a:r>
               <a:rPr lang="en-AU" sz="2400">
@@ -13699,31 +13858,7 @@
                 <a:cs typeface="Calibri"/>
                 <a:sym typeface="Calibri"/>
               </a:rPr>
-              <a:t>to be able to view the site in my preferred language</a:t>
-            </a:r>
-            <a:r>
-              <a:rPr b="0" i="0" lang="en-AU" sz="2400" u="none" cap="none" strike="noStrike">
-                <a:solidFill>
-                  <a:schemeClr val="dk1"/>
-                </a:solidFill>
-                <a:latin typeface="Calibri"/>
-                <a:ea typeface="Calibri"/>
-                <a:cs typeface="Calibri"/>
-                <a:sym typeface="Calibri"/>
-              </a:rPr>
-              <a:t> so that </a:t>
-            </a:r>
-            <a:r>
-              <a:rPr lang="en-AU" sz="2400">
-                <a:solidFill>
-                  <a:schemeClr val="dk1"/>
-                </a:solidFill>
-                <a:latin typeface="Calibri"/>
-                <a:ea typeface="Calibri"/>
-                <a:cs typeface="Calibri"/>
-                <a:sym typeface="Calibri"/>
-              </a:rPr>
-              <a:t>it is easier for me to understand the website</a:t>
+              <a:t> the website so that I can gain easy and quick access to it.</a:t>
             </a:r>
           </a:p>
         </p:txBody>
@@ -13803,7 +13938,7 @@
                 <a:cs typeface="Calibri"/>
                 <a:sym typeface="Calibri"/>
               </a:rPr>
-              <a:t> Majority of site text in selected language</a:t>
+              <a:t>No duplication</a:t>
             </a:r>
           </a:p>
           <a:p>
@@ -13828,7 +13963,7 @@
                 <a:cs typeface="Calibri"/>
                 <a:sym typeface="Calibri"/>
               </a:rPr>
-              <a:t>Correctly Translated</a:t>
+              <a:t>Able to favourite or bookmark specific web page in user account</a:t>
             </a:r>
           </a:p>
           <a:p>
@@ -13853,7 +13988,7 @@
                 <a:cs typeface="Calibri"/>
                 <a:sym typeface="Calibri"/>
               </a:rPr>
-              <a:t>Correctly selected language (not in French when Mandarin is selected)</a:t>
+              <a:t>Easily accessible area to re-select bookmarked item</a:t>
             </a:r>
           </a:p>
         </p:txBody>
@@ -13910,7 +14045,7 @@
                 <a:cs typeface="Calibri"/>
                 <a:sym typeface="Calibri"/>
               </a:rPr>
-              <a:t>Story Points: 4</a:t>
+              <a:t>Story Points: 2</a:t>
             </a:r>
           </a:p>
         </p:txBody>
@@ -13966,55 +14101,6 @@
                 <a:sym typeface="Calibri"/>
               </a:rPr>
               <a:t>Notes</a:t>
-            </a:r>
-          </a:p>
-          <a:p>
-            <a:pPr indent="-355600" lvl="0" marL="457200" marR="0" rtl="0" algn="l">
-              <a:spcBef>
-                <a:spcPts val="0"/>
-              </a:spcBef>
-              <a:buClr>
-                <a:schemeClr val="dk1"/>
-              </a:buClr>
-              <a:buSzPct val="100000"/>
-              <a:buFont typeface="Calibri"/>
-              <a:buChar char="●"/>
-            </a:pPr>
-            <a:r>
-              <a:rPr lang="en-AU" sz="2000">
-                <a:solidFill>
-                  <a:schemeClr val="dk1"/>
-                </a:solidFill>
-                <a:latin typeface="Calibri"/>
-                <a:ea typeface="Calibri"/>
-                <a:cs typeface="Calibri"/>
-                <a:sym typeface="Calibri"/>
-              </a:rPr>
-              <a:t>Language options are limited to </a:t>
-            </a:r>
-            <a:r>
-              <a:rPr lang="en-AU" sz="2000">
-                <a:solidFill>
-                  <a:schemeClr val="dk1"/>
-                </a:solidFill>
-                <a:latin typeface="Calibri"/>
-                <a:ea typeface="Calibri"/>
-                <a:cs typeface="Calibri"/>
-                <a:sym typeface="Calibri"/>
-              </a:rPr>
-              <a:t>three different types </a:t>
-            </a:r>
-            <a:r>
-              <a:rPr lang="en-AU" sz="2000">
-                <a:solidFill>
-                  <a:schemeClr val="dk1"/>
-                </a:solidFill>
-                <a:latin typeface="Calibri"/>
-                <a:ea typeface="Calibri"/>
-                <a:cs typeface="Calibri"/>
-                <a:sym typeface="Calibri"/>
-              </a:rPr>
-              <a:t>(specified by client)</a:t>
             </a:r>
           </a:p>
         </p:txBody>
@@ -14052,6 +14138,73 @@
         </p:nvSpPr>
         <p:spPr>
           <a:xfrm>
+            <a:off x="7535860" y="109400"/>
+            <a:ext cx="1539300" cy="540000"/>
+          </a:xfrm>
+          <a:prstGeom prst="rect">
+            <a:avLst/>
+          </a:prstGeom>
+          <a:solidFill>
+            <a:srgbClr val="E5DFEC"/>
+          </a:solidFill>
+          <a:ln cap="flat" cmpd="sng" w="25400">
+            <a:solidFill>
+              <a:srgbClr val="244061"/>
+            </a:solidFill>
+            <a:prstDash val="solid"/>
+            <a:round/>
+            <a:headEnd len="med" w="med" type="none"/>
+            <a:tailEnd len="med" w="med" type="none"/>
+          </a:ln>
+        </p:spPr>
+        <p:txBody>
+          <a:bodyPr anchorCtr="0" anchor="ctr" bIns="45700" lIns="0" rIns="0" wrap="square" tIns="45700">
+            <a:noAutofit/>
+          </a:bodyPr>
+          <a:lstStyle/>
+          <a:p>
+            <a:pPr indent="0" lvl="0" marL="0" marR="0" rtl="0" algn="ctr">
+              <a:spcBef>
+                <a:spcPts val="0"/>
+              </a:spcBef>
+              <a:buSzPct val="25000"/>
+              <a:buNone/>
+            </a:pPr>
+            <a:r>
+              <a:rPr lang="en-AU" sz="2000">
+                <a:solidFill>
+                  <a:schemeClr val="dk1"/>
+                </a:solidFill>
+                <a:latin typeface="Calibri"/>
+                <a:ea typeface="Calibri"/>
+                <a:cs typeface="Calibri"/>
+                <a:sym typeface="Calibri"/>
+              </a:rPr>
+              <a:t>Could</a:t>
+            </a:r>
+            <a:r>
+              <a:rPr lang="en-AU" sz="2000">
+                <a:solidFill>
+                  <a:schemeClr val="dk1"/>
+                </a:solidFill>
+                <a:latin typeface="Calibri"/>
+                <a:ea typeface="Calibri"/>
+                <a:cs typeface="Calibri"/>
+                <a:sym typeface="Calibri"/>
+              </a:rPr>
+              <a:t> Have</a:t>
+            </a:r>
+          </a:p>
+        </p:txBody>
+      </p:sp>
+      <p:sp>
+        <p:nvSpPr>
+          <p:cNvPr id="218" name="Shape 218"/>
+          <p:cNvSpPr/>
+          <p:nvPr/>
+        </p:nvSpPr>
+        <p:spPr>
+          <a:xfrm>
             <a:off x="39153" y="109410"/>
             <a:ext cx="720000" cy="540000"/>
           </a:xfrm>
@@ -14094,21 +14247,33 @@
                 <a:cs typeface="Calibri"/>
                 <a:sym typeface="Calibri"/>
               </a:rPr>
-              <a:t>Story ID O3</a:t>
+              <a:t>Story ID O</a:t>
+            </a:r>
+            <a:r>
+              <a:rPr lang="en-AU" sz="2000">
+                <a:solidFill>
+                  <a:schemeClr val="dk1"/>
+                </a:solidFill>
+                <a:latin typeface="Calibri"/>
+                <a:ea typeface="Calibri"/>
+                <a:cs typeface="Calibri"/>
+                <a:sym typeface="Calibri"/>
+              </a:rPr>
+              <a:t>2</a:t>
             </a:r>
           </a:p>
         </p:txBody>
       </p:sp>
       <p:sp>
         <p:nvSpPr>
-          <p:cNvPr id="218" name="Shape 218"/>
+          <p:cNvPr id="219" name="Shape 219"/>
           <p:cNvSpPr/>
           <p:nvPr/>
         </p:nvSpPr>
         <p:spPr>
           <a:xfrm>
             <a:off x="831150" y="109400"/>
-            <a:ext cx="6627600" cy="540000"/>
+            <a:ext cx="6646200" cy="540000"/>
           </a:xfrm>
           <a:prstGeom prst="rect">
             <a:avLst/>
@@ -14149,14 +14314,14 @@
                 <a:cs typeface="Calibri"/>
                 <a:sym typeface="Calibri"/>
               </a:rPr>
-              <a:t>Feedback Page</a:t>
+              <a:t>Language options</a:t>
             </a:r>
           </a:p>
         </p:txBody>
       </p:sp>
       <p:sp>
         <p:nvSpPr>
-          <p:cNvPr id="219" name="Shape 219"/>
+          <p:cNvPr id="220" name="Shape 220"/>
           <p:cNvSpPr/>
           <p:nvPr/>
         </p:nvSpPr>
@@ -14187,59 +14352,98 @@
           </a:bodyPr>
           <a:lstStyle/>
           <a:p>
-            <a:pPr indent="-69850" lvl="0" marL="0" marR="0" rtl="0" algn="l">
-              <a:spcBef>
-                <a:spcPts val="0"/>
-              </a:spcBef>
-              <a:buClr>
-                <a:schemeClr val="dk1"/>
-              </a:buClr>
-              <a:buSzPct val="45833"/>
-              <a:buFont typeface="Arial"/>
-              <a:buNone/>
-            </a:pPr>
+            <a:pPr indent="0" lvl="0" marL="0" marR="0" rtl="0" algn="l">
+              <a:spcBef>
+                <a:spcPts val="0"/>
+              </a:spcBef>
+              <a:buSzPct val="25000"/>
+              <a:buNone/>
+            </a:pPr>
+            <a:r>
+              <a:rPr b="0" i="0" lang="en-AU" sz="2400" u="none" cap="none" strike="noStrike">
+                <a:solidFill>
+                  <a:schemeClr val="dk1"/>
+                </a:solidFill>
+                <a:latin typeface="Calibri"/>
+                <a:ea typeface="Calibri"/>
+                <a:cs typeface="Calibri"/>
+                <a:sym typeface="Calibri"/>
+              </a:rPr>
+              <a:t>As a </a:t>
+            </a:r>
             <a:r>
               <a:rPr lang="en-AU" sz="2400">
-                <a:latin typeface="Calibri"/>
-                <a:ea typeface="Calibri"/>
-                <a:cs typeface="Calibri"/>
-                <a:sym typeface="Calibri"/>
-              </a:rPr>
-              <a:t>As a user, I want to be able to leave feedback so that I can suggest improvements or address an issue.</a:t>
-            </a:r>
-          </a:p>
-          <a:p>
-            <a:pPr indent="0" lvl="0" marL="0" marR="0" rtl="0" algn="l">
-              <a:spcBef>
-                <a:spcPts val="0"/>
-              </a:spcBef>
-              <a:buNone/>
-            </a:pPr>
-            <a:r>
-              <a:t/>
-            </a:r>
-            <a:endParaRPr sz="2400">
-              <a:solidFill>
-                <a:schemeClr val="dk1"/>
-              </a:solidFill>
-              <a:latin typeface="Calibri"/>
-              <a:ea typeface="Calibri"/>
-              <a:cs typeface="Calibri"/>
-              <a:sym typeface="Calibri"/>
-            </a:endParaRPr>
+                <a:solidFill>
+                  <a:schemeClr val="dk1"/>
+                </a:solidFill>
+                <a:latin typeface="Calibri"/>
+                <a:ea typeface="Calibri"/>
+                <a:cs typeface="Calibri"/>
+                <a:sym typeface="Calibri"/>
+              </a:rPr>
+              <a:t>User</a:t>
+            </a:r>
+            <a:r>
+              <a:rPr b="0" i="0" lang="en-AU" sz="2400" u="none" cap="none" strike="noStrike">
+                <a:solidFill>
+                  <a:schemeClr val="dk1"/>
+                </a:solidFill>
+                <a:latin typeface="Calibri"/>
+                <a:ea typeface="Calibri"/>
+                <a:cs typeface="Calibri"/>
+                <a:sym typeface="Calibri"/>
+              </a:rPr>
+              <a:t> I want </a:t>
+            </a:r>
+            <a:r>
+              <a:rPr lang="en-AU" sz="2400">
+                <a:solidFill>
+                  <a:schemeClr val="dk1"/>
+                </a:solidFill>
+                <a:latin typeface="Calibri"/>
+                <a:ea typeface="Calibri"/>
+                <a:cs typeface="Calibri"/>
+                <a:sym typeface="Calibri"/>
+              </a:rPr>
+              <a:t>to be able to view the site in my preferred language</a:t>
+            </a:r>
+            <a:r>
+              <a:rPr b="0" i="0" lang="en-AU" sz="2400" u="none" cap="none" strike="noStrike">
+                <a:solidFill>
+                  <a:schemeClr val="dk1"/>
+                </a:solidFill>
+                <a:latin typeface="Calibri"/>
+                <a:ea typeface="Calibri"/>
+                <a:cs typeface="Calibri"/>
+                <a:sym typeface="Calibri"/>
+              </a:rPr>
+              <a:t> so that </a:t>
+            </a:r>
+            <a:r>
+              <a:rPr lang="en-AU" sz="2400">
+                <a:solidFill>
+                  <a:schemeClr val="dk1"/>
+                </a:solidFill>
+                <a:latin typeface="Calibri"/>
+                <a:ea typeface="Calibri"/>
+                <a:cs typeface="Calibri"/>
+                <a:sym typeface="Calibri"/>
+              </a:rPr>
+              <a:t>it is easier for me to understand the website</a:t>
+            </a:r>
           </a:p>
         </p:txBody>
       </p:sp>
       <p:sp>
         <p:nvSpPr>
-          <p:cNvPr id="220" name="Shape 220"/>
+          <p:cNvPr id="221" name="Shape 221"/>
           <p:cNvSpPr/>
           <p:nvPr/>
         </p:nvSpPr>
         <p:spPr>
           <a:xfrm>
-            <a:off x="39150" y="3335522"/>
-            <a:ext cx="9828000" cy="2450400"/>
+            <a:off x="39153" y="3335530"/>
+            <a:ext cx="9828000" cy="1620000"/>
           </a:xfrm>
           <a:prstGeom prst="rect">
             <a:avLst/>
@@ -14289,7 +14493,32 @@
                 <a:spcPts val="0"/>
               </a:spcBef>
               <a:buClr>
-                <a:srgbClr val="38761D"/>
+                <a:schemeClr val="dk1"/>
+              </a:buClr>
+              <a:buSzPct val="100000"/>
+              <a:buFont typeface="Arial"/>
+              <a:buChar char="•"/>
+            </a:pPr>
+            <a:r>
+              <a:rPr lang="en-AU" sz="2000">
+                <a:solidFill>
+                  <a:schemeClr val="dk1"/>
+                </a:solidFill>
+                <a:latin typeface="Calibri"/>
+                <a:ea typeface="Calibri"/>
+                <a:cs typeface="Calibri"/>
+                <a:sym typeface="Calibri"/>
+              </a:rPr>
+              <a:t> Majority of site text in selected language</a:t>
+            </a:r>
+          </a:p>
+          <a:p>
+            <a:pPr indent="-179387" lvl="0" marL="179387" marR="0" rtl="0" algn="l">
+              <a:spcBef>
+                <a:spcPts val="0"/>
+              </a:spcBef>
+              <a:buClr>
+                <a:schemeClr val="dk1"/>
               </a:buClr>
               <a:buSzPct val="100000"/>
               <a:buFont typeface="Calibri"/>
@@ -14298,14 +14527,14 @@
             <a:r>
               <a:rPr lang="en-AU" sz="2000">
                 <a:solidFill>
-                  <a:srgbClr val="38761D"/>
-                </a:solidFill>
-                <a:latin typeface="Calibri"/>
-                <a:ea typeface="Calibri"/>
-                <a:cs typeface="Calibri"/>
-                <a:sym typeface="Calibri"/>
-              </a:rPr>
-              <a:t>Textboxes to take in user details (i.e. email) and message content</a:t>
+                  <a:schemeClr val="dk1"/>
+                </a:solidFill>
+                <a:latin typeface="Calibri"/>
+                <a:ea typeface="Calibri"/>
+                <a:cs typeface="Calibri"/>
+                <a:sym typeface="Calibri"/>
+              </a:rPr>
+              <a:t>Correctly Translated</a:t>
             </a:r>
           </a:p>
           <a:p>
@@ -14314,7 +14543,7 @@
                 <a:spcPts val="0"/>
               </a:spcBef>
               <a:buClr>
-                <a:srgbClr val="38761D"/>
+                <a:schemeClr val="dk1"/>
               </a:buClr>
               <a:buSzPct val="100000"/>
               <a:buFont typeface="Calibri"/>
@@ -14323,121 +14552,21 @@
             <a:r>
               <a:rPr lang="en-AU" sz="2000">
                 <a:solidFill>
-                  <a:srgbClr val="38761D"/>
-                </a:solidFill>
-                <a:latin typeface="Calibri"/>
-                <a:ea typeface="Calibri"/>
-                <a:cs typeface="Calibri"/>
-                <a:sym typeface="Calibri"/>
-              </a:rPr>
-              <a:t>Buttons for submission and to cancel form</a:t>
-            </a:r>
-          </a:p>
-          <a:p>
-            <a:pPr indent="-179387" lvl="0" marL="179387" marR="0" rtl="0" algn="l">
-              <a:spcBef>
-                <a:spcPts val="0"/>
-              </a:spcBef>
-              <a:buClr>
-                <a:srgbClr val="38761D"/>
-              </a:buClr>
-              <a:buSzPct val="100000"/>
-              <a:buFont typeface="Calibri"/>
-              <a:buChar char="•"/>
-            </a:pPr>
-            <a:r>
-              <a:rPr lang="en-AU" sz="2000">
-                <a:solidFill>
-                  <a:srgbClr val="38761D"/>
-                </a:solidFill>
-                <a:latin typeface="Calibri"/>
-                <a:ea typeface="Calibri"/>
-                <a:cs typeface="Calibri"/>
-                <a:sym typeface="Calibri"/>
-              </a:rPr>
-              <a:t>Once successfully submitted, user is redirected to homepage</a:t>
-            </a:r>
-          </a:p>
-          <a:p>
-            <a:pPr indent="-179387" lvl="0" marL="179387" marR="0" rtl="0" algn="l">
-              <a:spcBef>
-                <a:spcPts val="0"/>
-              </a:spcBef>
-              <a:buClr>
-                <a:srgbClr val="38761D"/>
-              </a:buClr>
-              <a:buSzPct val="100000"/>
-              <a:buFont typeface="Calibri"/>
-              <a:buChar char="•"/>
-            </a:pPr>
-            <a:r>
-              <a:rPr lang="en-AU" sz="2000">
-                <a:solidFill>
-                  <a:srgbClr val="38761D"/>
-                </a:solidFill>
-                <a:latin typeface="Calibri"/>
-                <a:ea typeface="Calibri"/>
-                <a:cs typeface="Calibri"/>
-                <a:sym typeface="Calibri"/>
-              </a:rPr>
-              <a:t>Optional: incorporate pop up message to tell user when form has been submitted</a:t>
-            </a:r>
-          </a:p>
-          <a:p>
-            <a:pPr indent="-179387" lvl="0" marL="179387" marR="0" rtl="0" algn="l">
-              <a:spcBef>
-                <a:spcPts val="0"/>
-              </a:spcBef>
-              <a:buClr>
-                <a:srgbClr val="38761D"/>
-              </a:buClr>
-              <a:buSzPct val="100000"/>
-              <a:buFont typeface="Calibri"/>
-              <a:buChar char="•"/>
-            </a:pPr>
-            <a:r>
-              <a:rPr lang="en-AU" sz="2000">
-                <a:solidFill>
-                  <a:srgbClr val="38761D"/>
-                </a:solidFill>
-                <a:latin typeface="Calibri"/>
-                <a:ea typeface="Calibri"/>
-                <a:cs typeface="Calibri"/>
-                <a:sym typeface="Calibri"/>
-              </a:rPr>
-              <a:t>Create database link to store form submission</a:t>
-            </a:r>
-          </a:p>
-          <a:p>
-            <a:pPr indent="-179387" lvl="0" marL="179387" marR="0" rtl="0" algn="l">
-              <a:spcBef>
-                <a:spcPts val="0"/>
-              </a:spcBef>
-              <a:buClr>
-                <a:srgbClr val="38761D"/>
-              </a:buClr>
-              <a:buSzPct val="100000"/>
-              <a:buFont typeface="Calibri"/>
-              <a:buChar char="•"/>
-            </a:pPr>
-            <a:r>
-              <a:rPr lang="en-AU" sz="2000">
-                <a:solidFill>
-                  <a:srgbClr val="38761D"/>
-                </a:solidFill>
-                <a:latin typeface="Calibri"/>
-                <a:ea typeface="Calibri"/>
-                <a:cs typeface="Calibri"/>
-                <a:sym typeface="Calibri"/>
-              </a:rPr>
-              <a:t>Ensure admin can access and view messages</a:t>
+                  <a:schemeClr val="dk1"/>
+                </a:solidFill>
+                <a:latin typeface="Calibri"/>
+                <a:ea typeface="Calibri"/>
+                <a:cs typeface="Calibri"/>
+                <a:sym typeface="Calibri"/>
+              </a:rPr>
+              <a:t>Correctly selected language (not in French when Mandarin is selected)</a:t>
             </a:r>
           </a:p>
         </p:txBody>
       </p:sp>
       <p:sp>
         <p:nvSpPr>
-          <p:cNvPr id="221" name="Shape 221"/>
+          <p:cNvPr id="222" name="Shape 222"/>
           <p:cNvSpPr/>
           <p:nvPr/>
         </p:nvSpPr>
@@ -14487,74 +14616,7 @@
                 <a:cs typeface="Calibri"/>
                 <a:sym typeface="Calibri"/>
               </a:rPr>
-              <a:t>Story Points:</a:t>
-            </a:r>
-            <a:r>
-              <a:rPr lang="en-AU" sz="1200">
-                <a:solidFill>
-                  <a:srgbClr val="38761D"/>
-                </a:solidFill>
-                <a:latin typeface="Calibri"/>
-                <a:ea typeface="Calibri"/>
-                <a:cs typeface="Calibri"/>
-                <a:sym typeface="Calibri"/>
-              </a:rPr>
-              <a:t> 4</a:t>
-            </a:r>
-          </a:p>
-        </p:txBody>
-      </p:sp>
-      <p:sp>
-        <p:nvSpPr>
-          <p:cNvPr id="222" name="Shape 222"/>
-          <p:cNvSpPr/>
-          <p:nvPr/>
-        </p:nvSpPr>
-        <p:spPr>
-          <a:xfrm>
-            <a:off x="8283153" y="109410"/>
-            <a:ext cx="792000" cy="540000"/>
-          </a:xfrm>
-          <a:prstGeom prst="rect">
-            <a:avLst/>
-          </a:prstGeom>
-          <a:solidFill>
-            <a:srgbClr val="E5DFEC"/>
-          </a:solidFill>
-          <a:ln cap="flat" cmpd="sng" w="25400">
-            <a:solidFill>
-              <a:srgbClr val="244061"/>
-            </a:solidFill>
-            <a:prstDash val="solid"/>
-            <a:round/>
-            <a:headEnd len="med" w="med" type="none"/>
-            <a:tailEnd len="med" w="med" type="none"/>
-          </a:ln>
-        </p:spPr>
-        <p:txBody>
-          <a:bodyPr anchorCtr="0" anchor="ctr" bIns="45700" lIns="0" rIns="0" wrap="square" tIns="45700">
-            <a:noAutofit/>
-          </a:bodyPr>
-          <a:lstStyle/>
-          <a:p>
-            <a:pPr indent="0" lvl="0" marL="0" marR="0" rtl="0" algn="ctr">
-              <a:spcBef>
-                <a:spcPts val="0"/>
-              </a:spcBef>
-              <a:buSzPct val="25000"/>
-              <a:buNone/>
-            </a:pPr>
-            <a:r>
-              <a:rPr lang="en-AU" sz="2000">
-                <a:solidFill>
-                  <a:schemeClr val="dk1"/>
-                </a:solidFill>
-                <a:latin typeface="Calibri"/>
-                <a:ea typeface="Calibri"/>
-                <a:cs typeface="Calibri"/>
-                <a:sym typeface="Calibri"/>
-              </a:rPr>
-              <a:t>Priority</a:t>
+              <a:t>Story Points: 4</a:t>
             </a:r>
           </a:p>
         </p:txBody>
@@ -14567,8 +14629,8 @@
         </p:nvSpPr>
         <p:spPr>
           <a:xfrm>
-            <a:off x="39150" y="5980045"/>
-            <a:ext cx="9828000" cy="768600"/>
+            <a:off x="39153" y="5128590"/>
+            <a:ext cx="9828000" cy="1620000"/>
           </a:xfrm>
           <a:prstGeom prst="rect">
             <a:avLst/>
@@ -14613,7 +14675,7 @@
             </a:r>
           </a:p>
           <a:p>
-            <a:pPr indent="-179387" lvl="0" marL="179387" marR="0" rtl="0" algn="l">
+            <a:pPr indent="-355600" lvl="0" marL="457200" marR="0" rtl="0" algn="l">
               <a:spcBef>
                 <a:spcPts val="0"/>
               </a:spcBef>
@@ -14621,8 +14683,8 @@
                 <a:schemeClr val="dk1"/>
               </a:buClr>
               <a:buSzPct val="100000"/>
-              <a:buFont typeface="Arial"/>
-              <a:buChar char="•"/>
+              <a:buFont typeface="Calibri"/>
+              <a:buChar char="●"/>
             </a:pPr>
             <a:r>
               <a:rPr lang="en-AU" sz="2000">
@@ -14634,51 +14696,8 @@
                 <a:cs typeface="Calibri"/>
                 <a:sym typeface="Calibri"/>
               </a:rPr>
-              <a:t>  </a:t>
-            </a:r>
-          </a:p>
-        </p:txBody>
-      </p:sp>
-      <p:sp>
-        <p:nvSpPr>
-          <p:cNvPr id="224" name="Shape 224"/>
-          <p:cNvSpPr/>
-          <p:nvPr/>
-        </p:nvSpPr>
-        <p:spPr>
-          <a:xfrm>
-            <a:off x="7535860" y="109400"/>
-            <a:ext cx="1539300" cy="540000"/>
-          </a:xfrm>
-          <a:prstGeom prst="rect">
-            <a:avLst/>
-          </a:prstGeom>
-          <a:solidFill>
-            <a:srgbClr val="E5DFEC"/>
-          </a:solidFill>
-          <a:ln cap="flat" cmpd="sng" w="25400">
-            <a:solidFill>
-              <a:srgbClr val="244061"/>
-            </a:solidFill>
-            <a:prstDash val="solid"/>
-            <a:round/>
-            <a:headEnd len="med" w="med" type="none"/>
-            <a:tailEnd len="med" w="med" type="none"/>
-          </a:ln>
-        </p:spPr>
-        <p:txBody>
-          <a:bodyPr anchorCtr="0" anchor="ctr" bIns="45700" lIns="0" rIns="0" wrap="square" tIns="45700">
-            <a:noAutofit/>
-          </a:bodyPr>
-          <a:lstStyle/>
-          <a:p>
-            <a:pPr indent="0" lvl="0" marL="0" marR="0" rtl="0" algn="ctr">
-              <a:spcBef>
-                <a:spcPts val="0"/>
-              </a:spcBef>
-              <a:buSzPct val="25000"/>
-              <a:buNone/>
-            </a:pPr>
+              <a:t>Language options are limited to </a:t>
+            </a:r>
             <a:r>
               <a:rPr lang="en-AU" sz="2000">
                 <a:solidFill>
@@ -14689,7 +14708,7 @@
                 <a:cs typeface="Calibri"/>
                 <a:sym typeface="Calibri"/>
               </a:rPr>
-              <a:t>Could</a:t>
+              <a:t>three different types </a:t>
             </a:r>
             <a:r>
               <a:rPr lang="en-AU" sz="2000">
@@ -14701,7 +14720,7 @@
                 <a:cs typeface="Calibri"/>
                 <a:sym typeface="Calibri"/>
               </a:rPr>
-              <a:t> Have</a:t>
+              <a:t>(specified by client)</a:t>
             </a:r>
           </a:p>
         </p:txBody>
@@ -14719,7 +14738,7 @@
   <p:cSld>
     <p:spTree>
       <p:nvGrpSpPr>
-        <p:cNvPr id="228" name="Shape 228"/>
+        <p:cNvPr id="227" name="Shape 227"/>
         <p:cNvGrpSpPr/>
         <p:nvPr/>
       </p:nvGrpSpPr>
@@ -14733,74 +14752,7 @@
       </p:grpSpPr>
       <p:sp>
         <p:nvSpPr>
-          <p:cNvPr id="229" name="Shape 229"/>
-          <p:cNvSpPr/>
-          <p:nvPr/>
-        </p:nvSpPr>
-        <p:spPr>
-          <a:xfrm>
-            <a:off x="7535860" y="109400"/>
-            <a:ext cx="1539300" cy="540000"/>
-          </a:xfrm>
-          <a:prstGeom prst="rect">
-            <a:avLst/>
-          </a:prstGeom>
-          <a:solidFill>
-            <a:srgbClr val="E5DFEC"/>
-          </a:solidFill>
-          <a:ln cap="flat" cmpd="sng" w="25400">
-            <a:solidFill>
-              <a:srgbClr val="244061"/>
-            </a:solidFill>
-            <a:prstDash val="solid"/>
-            <a:round/>
-            <a:headEnd len="med" w="med" type="none"/>
-            <a:tailEnd len="med" w="med" type="none"/>
-          </a:ln>
-        </p:spPr>
-        <p:txBody>
-          <a:bodyPr anchorCtr="0" anchor="ctr" bIns="45700" lIns="0" rIns="0" wrap="square" tIns="45700">
-            <a:noAutofit/>
-          </a:bodyPr>
-          <a:lstStyle/>
-          <a:p>
-            <a:pPr indent="0" lvl="0" marL="0" marR="0" rtl="0" algn="ctr">
-              <a:spcBef>
-                <a:spcPts val="0"/>
-              </a:spcBef>
-              <a:buSzPct val="25000"/>
-              <a:buNone/>
-            </a:pPr>
-            <a:r>
-              <a:rPr lang="en-AU" sz="2000">
-                <a:solidFill>
-                  <a:schemeClr val="dk1"/>
-                </a:solidFill>
-                <a:latin typeface="Calibri"/>
-                <a:ea typeface="Calibri"/>
-                <a:cs typeface="Calibri"/>
-                <a:sym typeface="Calibri"/>
-              </a:rPr>
-              <a:t>Should</a:t>
-            </a:r>
-            <a:r>
-              <a:rPr lang="en-AU" sz="2000">
-                <a:solidFill>
-                  <a:schemeClr val="dk1"/>
-                </a:solidFill>
-                <a:latin typeface="Calibri"/>
-                <a:ea typeface="Calibri"/>
-                <a:cs typeface="Calibri"/>
-                <a:sym typeface="Calibri"/>
-              </a:rPr>
-              <a:t> Have</a:t>
-            </a:r>
-          </a:p>
-        </p:txBody>
-      </p:sp>
-      <p:sp>
-        <p:nvSpPr>
-          <p:cNvPr id="230" name="Shape 230"/>
+          <p:cNvPr id="228" name="Shape 228"/>
           <p:cNvSpPr/>
           <p:nvPr/>
         </p:nvSpPr>
@@ -14848,14 +14800,14 @@
                 <a:cs typeface="Calibri"/>
                 <a:sym typeface="Calibri"/>
               </a:rPr>
-              <a:t>Story ID O4</a:t>
+              <a:t>Story ID O3</a:t>
             </a:r>
           </a:p>
         </p:txBody>
       </p:sp>
       <p:sp>
         <p:nvSpPr>
-          <p:cNvPr id="231" name="Shape 231"/>
+          <p:cNvPr id="229" name="Shape 229"/>
           <p:cNvSpPr/>
           <p:nvPr/>
         </p:nvSpPr>
@@ -14903,14 +14855,14 @@
                 <a:cs typeface="Calibri"/>
                 <a:sym typeface="Calibri"/>
               </a:rPr>
-              <a:t>More variety of information</a:t>
+              <a:t>Feedback Page</a:t>
             </a:r>
           </a:p>
         </p:txBody>
       </p:sp>
       <p:sp>
         <p:nvSpPr>
-          <p:cNvPr id="232" name="Shape 232"/>
+          <p:cNvPr id="230" name="Shape 230"/>
           <p:cNvSpPr/>
           <p:nvPr/>
         </p:nvSpPr>
@@ -14941,74 +14893,59 @@
           </a:bodyPr>
           <a:lstStyle/>
           <a:p>
+            <a:pPr indent="-69850" lvl="0" marL="0" marR="0" rtl="0" algn="l">
+              <a:spcBef>
+                <a:spcPts val="0"/>
+              </a:spcBef>
+              <a:buClr>
+                <a:schemeClr val="dk1"/>
+              </a:buClr>
+              <a:buSzPct val="45833"/>
+              <a:buFont typeface="Arial"/>
+              <a:buNone/>
+            </a:pPr>
+            <a:r>
+              <a:rPr lang="en-AU" sz="2400">
+                <a:latin typeface="Calibri"/>
+                <a:ea typeface="Calibri"/>
+                <a:cs typeface="Calibri"/>
+                <a:sym typeface="Calibri"/>
+              </a:rPr>
+              <a:t>As a user, I want to be able to leave feedback so that I can suggest improvements or address an issue.</a:t>
+            </a:r>
+          </a:p>
+          <a:p>
             <a:pPr indent="0" lvl="0" marL="0" marR="0" rtl="0" algn="l">
               <a:spcBef>
                 <a:spcPts val="0"/>
               </a:spcBef>
-              <a:buSzPct val="25000"/>
-              <a:buNone/>
-            </a:pPr>
-            <a:r>
-              <a:rPr b="0" i="0" lang="en-AU" sz="2400" u="none" cap="none" strike="noStrike">
-                <a:solidFill>
-                  <a:schemeClr val="dk1"/>
-                </a:solidFill>
-                <a:latin typeface="Calibri"/>
-                <a:ea typeface="Calibri"/>
-                <a:cs typeface="Calibri"/>
-                <a:sym typeface="Calibri"/>
-              </a:rPr>
-              <a:t>As a</a:t>
-            </a:r>
-            <a:r>
-              <a:rPr lang="en-AU" sz="2400">
-                <a:solidFill>
-                  <a:schemeClr val="dk1"/>
-                </a:solidFill>
-                <a:latin typeface="Calibri"/>
-                <a:ea typeface="Calibri"/>
-                <a:cs typeface="Calibri"/>
-                <a:sym typeface="Calibri"/>
-              </a:rPr>
-              <a:t> user</a:t>
-            </a:r>
-            <a:r>
-              <a:rPr b="0" i="0" lang="en-AU" sz="2400" u="none" cap="none" strike="noStrike">
-                <a:solidFill>
-                  <a:schemeClr val="dk1"/>
-                </a:solidFill>
-                <a:latin typeface="Calibri"/>
-                <a:ea typeface="Calibri"/>
-                <a:cs typeface="Calibri"/>
-                <a:sym typeface="Calibri"/>
-              </a:rPr>
-              <a:t> I want to be able to get access to more variety of inf</a:t>
-            </a:r>
-            <a:r>
-              <a:rPr lang="en-AU" sz="2400">
-                <a:solidFill>
-                  <a:schemeClr val="dk1"/>
-                </a:solidFill>
-                <a:latin typeface="Calibri"/>
-                <a:ea typeface="Calibri"/>
-                <a:cs typeface="Calibri"/>
-                <a:sym typeface="Calibri"/>
-              </a:rPr>
-              <a:t>ormation on available city services so that I do not have to look for those information elsewhere.</a:t>
-            </a:r>
+              <a:buNone/>
+            </a:pPr>
+            <a:r>
+              <a:t/>
+            </a:r>
+            <a:endParaRPr sz="2400">
+              <a:solidFill>
+                <a:schemeClr val="dk1"/>
+              </a:solidFill>
+              <a:latin typeface="Calibri"/>
+              <a:ea typeface="Calibri"/>
+              <a:cs typeface="Calibri"/>
+              <a:sym typeface="Calibri"/>
+            </a:endParaRPr>
           </a:p>
         </p:txBody>
       </p:sp>
       <p:sp>
         <p:nvSpPr>
-          <p:cNvPr id="233" name="Shape 233"/>
+          <p:cNvPr id="231" name="Shape 231"/>
           <p:cNvSpPr/>
           <p:nvPr/>
         </p:nvSpPr>
         <p:spPr>
           <a:xfrm>
-            <a:off x="39153" y="3335530"/>
-            <a:ext cx="9828000" cy="1620000"/>
+            <a:off x="39150" y="3335522"/>
+            <a:ext cx="9828000" cy="2450400"/>
           </a:xfrm>
           <a:prstGeom prst="rect">
             <a:avLst/>
@@ -15058,30 +14995,155 @@
                 <a:spcPts val="0"/>
               </a:spcBef>
               <a:buClr>
-                <a:schemeClr val="dk1"/>
+                <a:srgbClr val="38761D"/>
               </a:buClr>
               <a:buSzPct val="100000"/>
-              <a:buFont typeface="Arial"/>
+              <a:buFont typeface="Calibri"/>
               <a:buChar char="•"/>
             </a:pPr>
             <a:r>
               <a:rPr lang="en-AU" sz="2000">
                 <a:solidFill>
-                  <a:schemeClr val="dk1"/>
-                </a:solidFill>
-                <a:latin typeface="Calibri"/>
-                <a:ea typeface="Calibri"/>
-                <a:cs typeface="Calibri"/>
-                <a:sym typeface="Calibri"/>
-              </a:rPr>
-              <a:t> Ensure scalability to include variety of services such as public transport services, health services and much more.</a:t>
+                  <a:srgbClr val="38761D"/>
+                </a:solidFill>
+                <a:latin typeface="Calibri"/>
+                <a:ea typeface="Calibri"/>
+                <a:cs typeface="Calibri"/>
+                <a:sym typeface="Calibri"/>
+              </a:rPr>
+              <a:t>Textboxes to take in user details (i.e. email) and message content</a:t>
+            </a:r>
+          </a:p>
+          <a:p>
+            <a:pPr indent="-179387" lvl="0" marL="179387" marR="0" rtl="0" algn="l">
+              <a:spcBef>
+                <a:spcPts val="0"/>
+              </a:spcBef>
+              <a:buClr>
+                <a:srgbClr val="38761D"/>
+              </a:buClr>
+              <a:buSzPct val="100000"/>
+              <a:buFont typeface="Calibri"/>
+              <a:buChar char="•"/>
+            </a:pPr>
+            <a:r>
+              <a:rPr lang="en-AU" sz="2000">
+                <a:solidFill>
+                  <a:srgbClr val="38761D"/>
+                </a:solidFill>
+                <a:latin typeface="Calibri"/>
+                <a:ea typeface="Calibri"/>
+                <a:cs typeface="Calibri"/>
+                <a:sym typeface="Calibri"/>
+              </a:rPr>
+              <a:t>Buttons for submission and to cancel form</a:t>
+            </a:r>
+          </a:p>
+          <a:p>
+            <a:pPr indent="-179387" lvl="0" marL="179387" marR="0" rtl="0" algn="l">
+              <a:spcBef>
+                <a:spcPts val="0"/>
+              </a:spcBef>
+              <a:buClr>
+                <a:srgbClr val="38761D"/>
+              </a:buClr>
+              <a:buSzPct val="100000"/>
+              <a:buFont typeface="Calibri"/>
+              <a:buChar char="•"/>
+            </a:pPr>
+            <a:r>
+              <a:rPr lang="en-AU" sz="2000">
+                <a:solidFill>
+                  <a:srgbClr val="38761D"/>
+                </a:solidFill>
+                <a:latin typeface="Calibri"/>
+                <a:ea typeface="Calibri"/>
+                <a:cs typeface="Calibri"/>
+                <a:sym typeface="Calibri"/>
+              </a:rPr>
+              <a:t>Once successfully submitted, user is redirected to homepage</a:t>
+            </a:r>
+          </a:p>
+          <a:p>
+            <a:pPr indent="-179387" lvl="0" marL="179387" marR="0" rtl="0" algn="l">
+              <a:spcBef>
+                <a:spcPts val="0"/>
+              </a:spcBef>
+              <a:buClr>
+                <a:srgbClr val="38761D"/>
+              </a:buClr>
+              <a:buSzPct val="100000"/>
+              <a:buFont typeface="Calibri"/>
+              <a:buChar char="•"/>
+            </a:pPr>
+            <a:r>
+              <a:rPr lang="en-AU" sz="2000">
+                <a:solidFill>
+                  <a:srgbClr val="38761D"/>
+                </a:solidFill>
+                <a:latin typeface="Calibri"/>
+                <a:ea typeface="Calibri"/>
+                <a:cs typeface="Calibri"/>
+                <a:sym typeface="Calibri"/>
+              </a:rPr>
+              <a:t>Optional: incorporate pop up message to tell user when form has been submitted</a:t>
+            </a:r>
+          </a:p>
+          <a:p>
+            <a:pPr indent="-179387" lvl="0" marL="179387" marR="0" rtl="0" algn="l">
+              <a:spcBef>
+                <a:spcPts val="0"/>
+              </a:spcBef>
+              <a:buClr>
+                <a:srgbClr val="38761D"/>
+              </a:buClr>
+              <a:buSzPct val="100000"/>
+              <a:buFont typeface="Calibri"/>
+              <a:buChar char="•"/>
+            </a:pPr>
+            <a:r>
+              <a:rPr lang="en-AU" sz="2000">
+                <a:solidFill>
+                  <a:srgbClr val="38761D"/>
+                </a:solidFill>
+                <a:latin typeface="Calibri"/>
+                <a:ea typeface="Calibri"/>
+                <a:cs typeface="Calibri"/>
+                <a:sym typeface="Calibri"/>
+              </a:rPr>
+              <a:t>Create database link to store form submission</a:t>
+            </a:r>
+          </a:p>
+          <a:p>
+            <a:pPr indent="-179387" lvl="0" marL="179387" marR="0" rtl="0" algn="l">
+              <a:spcBef>
+                <a:spcPts val="0"/>
+              </a:spcBef>
+              <a:buClr>
+                <a:srgbClr val="38761D"/>
+              </a:buClr>
+              <a:buSzPct val="100000"/>
+              <a:buFont typeface="Calibri"/>
+              <a:buChar char="•"/>
+            </a:pPr>
+            <a:r>
+              <a:rPr lang="en-AU" sz="2000">
+                <a:solidFill>
+                  <a:srgbClr val="38761D"/>
+                </a:solidFill>
+                <a:latin typeface="Calibri"/>
+                <a:ea typeface="Calibri"/>
+                <a:cs typeface="Calibri"/>
+                <a:sym typeface="Calibri"/>
+              </a:rPr>
+              <a:t>Ensure admin can access and view messages</a:t>
             </a:r>
           </a:p>
         </p:txBody>
       </p:sp>
       <p:sp>
         <p:nvSpPr>
-          <p:cNvPr id="234" name="Shape 234"/>
+          <p:cNvPr id="232" name="Shape 232"/>
           <p:cNvSpPr/>
           <p:nvPr/>
         </p:nvSpPr>
@@ -15131,21 +15193,88 @@
                 <a:cs typeface="Calibri"/>
                 <a:sym typeface="Calibri"/>
               </a:rPr>
-              <a:t>Story Points: 2</a:t>
+              <a:t>Story Points:</a:t>
+            </a:r>
+            <a:r>
+              <a:rPr lang="en-AU" sz="1200">
+                <a:solidFill>
+                  <a:srgbClr val="38761D"/>
+                </a:solidFill>
+                <a:latin typeface="Calibri"/>
+                <a:ea typeface="Calibri"/>
+                <a:cs typeface="Calibri"/>
+                <a:sym typeface="Calibri"/>
+              </a:rPr>
+              <a:t> 4</a:t>
             </a:r>
           </a:p>
         </p:txBody>
       </p:sp>
       <p:sp>
         <p:nvSpPr>
-          <p:cNvPr id="235" name="Shape 235"/>
+          <p:cNvPr id="233" name="Shape 233"/>
           <p:cNvSpPr/>
           <p:nvPr/>
         </p:nvSpPr>
         <p:spPr>
           <a:xfrm>
-            <a:off x="39153" y="5128590"/>
-            <a:ext cx="9828000" cy="1620000"/>
+            <a:off x="8283153" y="109410"/>
+            <a:ext cx="792000" cy="540000"/>
+          </a:xfrm>
+          <a:prstGeom prst="rect">
+            <a:avLst/>
+          </a:prstGeom>
+          <a:solidFill>
+            <a:srgbClr val="E5DFEC"/>
+          </a:solidFill>
+          <a:ln cap="flat" cmpd="sng" w="25400">
+            <a:solidFill>
+              <a:srgbClr val="244061"/>
+            </a:solidFill>
+            <a:prstDash val="solid"/>
+            <a:round/>
+            <a:headEnd len="med" w="med" type="none"/>
+            <a:tailEnd len="med" w="med" type="none"/>
+          </a:ln>
+        </p:spPr>
+        <p:txBody>
+          <a:bodyPr anchorCtr="0" anchor="ctr" bIns="45700" lIns="0" rIns="0" wrap="square" tIns="45700">
+            <a:noAutofit/>
+          </a:bodyPr>
+          <a:lstStyle/>
+          <a:p>
+            <a:pPr indent="0" lvl="0" marL="0" marR="0" rtl="0" algn="ctr">
+              <a:spcBef>
+                <a:spcPts val="0"/>
+              </a:spcBef>
+              <a:buSzPct val="25000"/>
+              <a:buNone/>
+            </a:pPr>
+            <a:r>
+              <a:rPr lang="en-AU" sz="2000">
+                <a:solidFill>
+                  <a:schemeClr val="dk1"/>
+                </a:solidFill>
+                <a:latin typeface="Calibri"/>
+                <a:ea typeface="Calibri"/>
+                <a:cs typeface="Calibri"/>
+                <a:sym typeface="Calibri"/>
+              </a:rPr>
+              <a:t>Priority</a:t>
+            </a:r>
+          </a:p>
+        </p:txBody>
+      </p:sp>
+      <p:sp>
+        <p:nvSpPr>
+          <p:cNvPr id="234" name="Shape 234"/>
+          <p:cNvSpPr/>
+          <p:nvPr/>
+        </p:nvSpPr>
+        <p:spPr>
+          <a:xfrm>
+            <a:off x="39150" y="5980045"/>
+            <a:ext cx="9828000" cy="768600"/>
           </a:xfrm>
           <a:prstGeom prst="rect">
             <a:avLst/>
@@ -15187,6 +15316,98 @@
                 <a:sym typeface="Calibri"/>
               </a:rPr>
               <a:t>Notes</a:t>
+            </a:r>
+          </a:p>
+          <a:p>
+            <a:pPr indent="-179387" lvl="0" marL="179387" marR="0" rtl="0" algn="l">
+              <a:spcBef>
+                <a:spcPts val="0"/>
+              </a:spcBef>
+              <a:buClr>
+                <a:schemeClr val="dk1"/>
+              </a:buClr>
+              <a:buSzPct val="100000"/>
+              <a:buFont typeface="Arial"/>
+              <a:buChar char="•"/>
+            </a:pPr>
+            <a:r>
+              <a:rPr lang="en-AU" sz="2000">
+                <a:solidFill>
+                  <a:schemeClr val="dk1"/>
+                </a:solidFill>
+                <a:latin typeface="Calibri"/>
+                <a:ea typeface="Calibri"/>
+                <a:cs typeface="Calibri"/>
+                <a:sym typeface="Calibri"/>
+              </a:rPr>
+              <a:t>  </a:t>
+            </a:r>
+          </a:p>
+        </p:txBody>
+      </p:sp>
+      <p:sp>
+        <p:nvSpPr>
+          <p:cNvPr id="235" name="Shape 235"/>
+          <p:cNvSpPr/>
+          <p:nvPr/>
+        </p:nvSpPr>
+        <p:spPr>
+          <a:xfrm>
+            <a:off x="7535860" y="109400"/>
+            <a:ext cx="1539300" cy="540000"/>
+          </a:xfrm>
+          <a:prstGeom prst="rect">
+            <a:avLst/>
+          </a:prstGeom>
+          <a:solidFill>
+            <a:srgbClr val="E5DFEC"/>
+          </a:solidFill>
+          <a:ln cap="flat" cmpd="sng" w="25400">
+            <a:solidFill>
+              <a:srgbClr val="244061"/>
+            </a:solidFill>
+            <a:prstDash val="solid"/>
+            <a:round/>
+            <a:headEnd len="med" w="med" type="none"/>
+            <a:tailEnd len="med" w="med" type="none"/>
+          </a:ln>
+        </p:spPr>
+        <p:txBody>
+          <a:bodyPr anchorCtr="0" anchor="ctr" bIns="45700" lIns="0" rIns="0" wrap="square" tIns="45700">
+            <a:noAutofit/>
+          </a:bodyPr>
+          <a:lstStyle/>
+          <a:p>
+            <a:pPr indent="0" lvl="0" marL="0" marR="0" rtl="0" algn="ctr">
+              <a:spcBef>
+                <a:spcPts val="0"/>
+              </a:spcBef>
+              <a:buSzPct val="25000"/>
+              <a:buNone/>
+            </a:pPr>
+            <a:r>
+              <a:rPr lang="en-AU" sz="2000">
+                <a:solidFill>
+                  <a:schemeClr val="dk1"/>
+                </a:solidFill>
+                <a:latin typeface="Calibri"/>
+                <a:ea typeface="Calibri"/>
+                <a:cs typeface="Calibri"/>
+                <a:sym typeface="Calibri"/>
+              </a:rPr>
+              <a:t>Could</a:t>
+            </a:r>
+            <a:r>
+              <a:rPr lang="en-AU" sz="2000">
+                <a:solidFill>
+                  <a:schemeClr val="dk1"/>
+                </a:solidFill>
+                <a:latin typeface="Calibri"/>
+                <a:ea typeface="Calibri"/>
+                <a:cs typeface="Calibri"/>
+                <a:sym typeface="Calibri"/>
+              </a:rPr>
+              <a:t> Have</a:t>
             </a:r>
           </a:p>
         </p:txBody>
@@ -15266,7 +15487,19 @@
                 <a:cs typeface="Calibri"/>
                 <a:sym typeface="Calibri"/>
               </a:rPr>
-              <a:t>Should Have</a:t>
+              <a:t>Should</a:t>
+            </a:r>
+            <a:r>
+              <a:rPr lang="en-AU" sz="2000">
+                <a:solidFill>
+                  <a:schemeClr val="dk1"/>
+                </a:solidFill>
+                <a:latin typeface="Calibri"/>
+                <a:ea typeface="Calibri"/>
+                <a:cs typeface="Calibri"/>
+                <a:sym typeface="Calibri"/>
+              </a:rPr>
+              <a:t> Have</a:t>
             </a:r>
           </a:p>
         </p:txBody>
@@ -15321,19 +15554,7 @@
                 <a:cs typeface="Calibri"/>
                 <a:sym typeface="Calibri"/>
               </a:rPr>
-              <a:t>Story ID </a:t>
-            </a:r>
-            <a:r>
-              <a:rPr lang="en-AU" sz="2000">
-                <a:solidFill>
-                  <a:schemeClr val="dk1"/>
-                </a:solidFill>
-                <a:latin typeface="Calibri"/>
-                <a:ea typeface="Calibri"/>
-                <a:cs typeface="Calibri"/>
-                <a:sym typeface="Calibri"/>
-              </a:rPr>
-              <a:t>O5</a:t>
+              <a:t>Story ID O4</a:t>
             </a:r>
           </a:p>
         </p:txBody>
@@ -15347,7 +15568,7 @@
         <p:spPr>
           <a:xfrm>
             <a:off x="831150" y="109400"/>
-            <a:ext cx="6636900" cy="540000"/>
+            <a:ext cx="6627600" cy="540000"/>
           </a:xfrm>
           <a:prstGeom prst="rect">
             <a:avLst/>
@@ -15388,7 +15609,7 @@
                 <a:cs typeface="Calibri"/>
                 <a:sym typeface="Calibri"/>
               </a:rPr>
-              <a:t>Other cities</a:t>
+              <a:t>More variety of information</a:t>
             </a:r>
           </a:p>
         </p:txBody>
@@ -15455,7 +15676,31 @@
                 <a:cs typeface="Calibri"/>
                 <a:sym typeface="Calibri"/>
               </a:rPr>
-              <a:t> user, I should be able to get similar information about other cities so that I can travel the country</a:t>
+              <a:t> user</a:t>
+            </a:r>
+            <a:r>
+              <a:rPr b="0" i="0" lang="en-AU" sz="2400" u="none" cap="none" strike="noStrike">
+                <a:solidFill>
+                  <a:schemeClr val="dk1"/>
+                </a:solidFill>
+                <a:latin typeface="Calibri"/>
+                <a:ea typeface="Calibri"/>
+                <a:cs typeface="Calibri"/>
+                <a:sym typeface="Calibri"/>
+              </a:rPr>
+              <a:t> I want to be able to get access to more variety of inf</a:t>
+            </a:r>
+            <a:r>
+              <a:rPr lang="en-AU" sz="2400">
+                <a:solidFill>
+                  <a:schemeClr val="dk1"/>
+                </a:solidFill>
+                <a:latin typeface="Calibri"/>
+                <a:ea typeface="Calibri"/>
+                <a:cs typeface="Calibri"/>
+                <a:sym typeface="Calibri"/>
+              </a:rPr>
+              <a:t>ormation on available city services so that I do not have to look for those information elsewhere.</a:t>
             </a:r>
           </a:p>
         </p:txBody>
@@ -15522,7 +15767,7 @@
                 <a:schemeClr val="dk1"/>
               </a:buClr>
               <a:buSzPct val="100000"/>
-              <a:buFont typeface="Calibri"/>
+              <a:buFont typeface="Arial"/>
               <a:buChar char="•"/>
             </a:pPr>
             <a:r>
@@ -15535,32 +15780,7 @@
                 <a:cs typeface="Calibri"/>
                 <a:sym typeface="Calibri"/>
               </a:rPr>
-              <a:t>Includes all information on any cities in Australia</a:t>
-            </a:r>
-          </a:p>
-          <a:p>
-            <a:pPr indent="-179387" lvl="0" marL="179387" marR="0" rtl="0" algn="l">
-              <a:spcBef>
-                <a:spcPts val="0"/>
-              </a:spcBef>
-              <a:buClr>
-                <a:schemeClr val="dk1"/>
-              </a:buClr>
-              <a:buSzPct val="100000"/>
-              <a:buFont typeface="Calibri"/>
-              <a:buChar char="•"/>
-            </a:pPr>
-            <a:r>
-              <a:rPr lang="en-AU" sz="2000">
-                <a:solidFill>
-                  <a:schemeClr val="dk1"/>
-                </a:solidFill>
-                <a:latin typeface="Calibri"/>
-                <a:ea typeface="Calibri"/>
-                <a:cs typeface="Calibri"/>
-                <a:sym typeface="Calibri"/>
-              </a:rPr>
-              <a:t>Data or information presented in the same format as with “Discover Brisbane”</a:t>
+              <a:t> Ensure scalability to include variety of services such as public transport services, health services and much more.</a:t>
             </a:r>
           </a:p>
         </p:txBody>
@@ -15625,6 +15845,492 @@
       <p:sp>
         <p:nvSpPr>
           <p:cNvPr id="246" name="Shape 246"/>
+          <p:cNvSpPr/>
+          <p:nvPr/>
+        </p:nvSpPr>
+        <p:spPr>
+          <a:xfrm>
+            <a:off x="39153" y="5128590"/>
+            <a:ext cx="9828000" cy="1620000"/>
+          </a:xfrm>
+          <a:prstGeom prst="rect">
+            <a:avLst/>
+          </a:prstGeom>
+          <a:solidFill>
+            <a:schemeClr val="lt1"/>
+          </a:solidFill>
+          <a:ln cap="flat" cmpd="sng" w="25400">
+            <a:solidFill>
+              <a:srgbClr val="244061"/>
+            </a:solidFill>
+            <a:prstDash val="solid"/>
+            <a:round/>
+            <a:headEnd len="med" w="med" type="none"/>
+            <a:tailEnd len="med" w="med" type="none"/>
+          </a:ln>
+        </p:spPr>
+        <p:txBody>
+          <a:bodyPr anchorCtr="0" anchor="t" bIns="45700" lIns="91425" rIns="91425" wrap="square" tIns="36000">
+            <a:noAutofit/>
+          </a:bodyPr>
+          <a:lstStyle/>
+          <a:p>
+            <a:pPr indent="0" lvl="0" marL="0" marR="0" rtl="0" algn="l">
+              <a:spcBef>
+                <a:spcPts val="0"/>
+              </a:spcBef>
+              <a:buSzPct val="25000"/>
+              <a:buNone/>
+            </a:pPr>
+            <a:r>
+              <a:rPr lang="en-AU" sz="2000">
+                <a:solidFill>
+                  <a:schemeClr val="dk1"/>
+                </a:solidFill>
+                <a:latin typeface="Calibri"/>
+                <a:ea typeface="Calibri"/>
+                <a:cs typeface="Calibri"/>
+                <a:sym typeface="Calibri"/>
+              </a:rPr>
+              <a:t>Notes</a:t>
+            </a:r>
+          </a:p>
+        </p:txBody>
+      </p:sp>
+    </p:spTree>
+  </p:cSld>
+  <p:clrMapOvr>
+    <a:masterClrMapping/>
+  </p:clrMapOvr>
+</p:sld>
+</file>
+
+<file path=ppt/slides/slide17.xml><?xml version="1.0" encoding="utf-8"?>
+<p:sld xmlns:a="http://schemas.openxmlformats.org/drawingml/2006/main" xmlns:r="http://schemas.openxmlformats.org/officeDocument/2006/relationships" xmlns:mc="http://schemas.openxmlformats.org/markup-compatibility/2006" xmlns:mv="urn:schemas-microsoft-com:mac:vml" xmlns:p="http://schemas.openxmlformats.org/presentationml/2006/main" xmlns:c="http://schemas.openxmlformats.org/drawingml/2006/chart" xmlns:dgm="http://schemas.openxmlformats.org/drawingml/2006/diagram" xmlns:o="urn:schemas-microsoft-com:office:office" xmlns:v="urn:schemas-microsoft-com:vml" xmlns:pvml="urn:schemas-microsoft-com:office:powerpoint" xmlns:com="http://schemas.openxmlformats.org/drawingml/2006/compatibility" xmlns:p14="http://schemas.microsoft.com/office/powerpoint/2010/main" xmlns:p15="http://schemas.microsoft.com/office/powerpoint/2012/main">
+  <p:cSld>
+    <p:spTree>
+      <p:nvGrpSpPr>
+        <p:cNvPr id="250" name="Shape 250"/>
+        <p:cNvGrpSpPr/>
+        <p:nvPr/>
+      </p:nvGrpSpPr>
+      <p:grpSpPr>
+        <a:xfrm>
+          <a:off x="0" y="0"/>
+          <a:ext cx="0" cy="0"/>
+          <a:chOff x="0" y="0"/>
+          <a:chExt cx="0" cy="0"/>
+        </a:xfrm>
+      </p:grpSpPr>
+      <p:sp>
+        <p:nvSpPr>
+          <p:cNvPr id="251" name="Shape 251"/>
+          <p:cNvSpPr/>
+          <p:nvPr/>
+        </p:nvSpPr>
+        <p:spPr>
+          <a:xfrm>
+            <a:off x="7535860" y="109400"/>
+            <a:ext cx="1539300" cy="540000"/>
+          </a:xfrm>
+          <a:prstGeom prst="rect">
+            <a:avLst/>
+          </a:prstGeom>
+          <a:solidFill>
+            <a:srgbClr val="E5DFEC"/>
+          </a:solidFill>
+          <a:ln cap="flat" cmpd="sng" w="25400">
+            <a:solidFill>
+              <a:srgbClr val="244061"/>
+            </a:solidFill>
+            <a:prstDash val="solid"/>
+            <a:round/>
+            <a:headEnd len="med" w="med" type="none"/>
+            <a:tailEnd len="med" w="med" type="none"/>
+          </a:ln>
+        </p:spPr>
+        <p:txBody>
+          <a:bodyPr anchorCtr="0" anchor="ctr" bIns="45700" lIns="0" rIns="0" wrap="square" tIns="45700">
+            <a:noAutofit/>
+          </a:bodyPr>
+          <a:lstStyle/>
+          <a:p>
+            <a:pPr indent="0" lvl="0" marL="0" marR="0" rtl="0" algn="ctr">
+              <a:spcBef>
+                <a:spcPts val="0"/>
+              </a:spcBef>
+              <a:buSzPct val="25000"/>
+              <a:buNone/>
+            </a:pPr>
+            <a:r>
+              <a:rPr lang="en-AU" sz="2000">
+                <a:solidFill>
+                  <a:schemeClr val="dk1"/>
+                </a:solidFill>
+                <a:latin typeface="Calibri"/>
+                <a:ea typeface="Calibri"/>
+                <a:cs typeface="Calibri"/>
+                <a:sym typeface="Calibri"/>
+              </a:rPr>
+              <a:t>Should Have</a:t>
+            </a:r>
+          </a:p>
+        </p:txBody>
+      </p:sp>
+      <p:sp>
+        <p:nvSpPr>
+          <p:cNvPr id="252" name="Shape 252"/>
+          <p:cNvSpPr/>
+          <p:nvPr/>
+        </p:nvSpPr>
+        <p:spPr>
+          <a:xfrm>
+            <a:off x="39153" y="109410"/>
+            <a:ext cx="720000" cy="540000"/>
+          </a:xfrm>
+          <a:prstGeom prst="rect">
+            <a:avLst/>
+          </a:prstGeom>
+          <a:solidFill>
+            <a:srgbClr val="B7CCE4"/>
+          </a:solidFill>
+          <a:ln cap="flat" cmpd="sng" w="25400">
+            <a:solidFill>
+              <a:srgbClr val="244061"/>
+            </a:solidFill>
+            <a:prstDash val="solid"/>
+            <a:round/>
+            <a:headEnd len="med" w="med" type="none"/>
+            <a:tailEnd len="med" w="med" type="none"/>
+          </a:ln>
+        </p:spPr>
+        <p:txBody>
+          <a:bodyPr anchorCtr="0" anchor="ctr" bIns="45700" lIns="0" rIns="0" wrap="square" tIns="45700">
+            <a:noAutofit/>
+          </a:bodyPr>
+          <a:lstStyle/>
+          <a:p>
+            <a:pPr indent="0" lvl="0" marL="0" marR="0" rtl="0" algn="ctr">
+              <a:spcBef>
+                <a:spcPts val="0"/>
+              </a:spcBef>
+              <a:buSzPct val="25000"/>
+              <a:buNone/>
+            </a:pPr>
+            <a:r>
+              <a:rPr b="0" i="0" lang="en-AU" sz="2000" u="none" cap="none" strike="noStrike">
+                <a:solidFill>
+                  <a:schemeClr val="dk1"/>
+                </a:solidFill>
+                <a:latin typeface="Calibri"/>
+                <a:ea typeface="Calibri"/>
+                <a:cs typeface="Calibri"/>
+                <a:sym typeface="Calibri"/>
+              </a:rPr>
+              <a:t>Story ID </a:t>
+            </a:r>
+            <a:r>
+              <a:rPr lang="en-AU" sz="2000">
+                <a:solidFill>
+                  <a:schemeClr val="dk1"/>
+                </a:solidFill>
+                <a:latin typeface="Calibri"/>
+                <a:ea typeface="Calibri"/>
+                <a:cs typeface="Calibri"/>
+                <a:sym typeface="Calibri"/>
+              </a:rPr>
+              <a:t>O5</a:t>
+            </a:r>
+          </a:p>
+        </p:txBody>
+      </p:sp>
+      <p:sp>
+        <p:nvSpPr>
+          <p:cNvPr id="253" name="Shape 253"/>
+          <p:cNvSpPr/>
+          <p:nvPr/>
+        </p:nvSpPr>
+        <p:spPr>
+          <a:xfrm>
+            <a:off x="831150" y="109400"/>
+            <a:ext cx="6636900" cy="540000"/>
+          </a:xfrm>
+          <a:prstGeom prst="rect">
+            <a:avLst/>
+          </a:prstGeom>
+          <a:solidFill>
+            <a:schemeClr val="accent1"/>
+          </a:solidFill>
+          <a:ln cap="flat" cmpd="sng" w="25400">
+            <a:solidFill>
+              <a:srgbClr val="244061"/>
+            </a:solidFill>
+            <a:prstDash val="solid"/>
+            <a:round/>
+            <a:headEnd len="med" w="med" type="none"/>
+            <a:tailEnd len="med" w="med" type="none"/>
+          </a:ln>
+        </p:spPr>
+        <p:txBody>
+          <a:bodyPr anchorCtr="0" anchor="ctr" bIns="45700" lIns="91425" rIns="91425" wrap="square" tIns="45700">
+            <a:noAutofit/>
+          </a:bodyPr>
+          <a:lstStyle/>
+          <a:p>
+            <a:pPr indent="0" lvl="0" marL="0" marR="0" rtl="0" algn="ctr">
+              <a:spcBef>
+                <a:spcPts val="0"/>
+              </a:spcBef>
+              <a:buSzPct val="25000"/>
+              <a:buNone/>
+            </a:pPr>
+            <a:r>
+              <a:rPr lang="en-AU" sz="2800">
+                <a:solidFill>
+                  <a:schemeClr val="lt1"/>
+                </a:solidFill>
+                <a:latin typeface="Calibri"/>
+                <a:ea typeface="Calibri"/>
+                <a:cs typeface="Calibri"/>
+                <a:sym typeface="Calibri"/>
+              </a:rPr>
+              <a:t>Other cities</a:t>
+            </a:r>
+          </a:p>
+        </p:txBody>
+      </p:sp>
+      <p:sp>
+        <p:nvSpPr>
+          <p:cNvPr id="254" name="Shape 254"/>
+          <p:cNvSpPr/>
+          <p:nvPr/>
+        </p:nvSpPr>
+        <p:spPr>
+          <a:xfrm>
+            <a:off x="39153" y="822470"/>
+            <a:ext cx="9828000" cy="2340000"/>
+          </a:xfrm>
+          <a:prstGeom prst="rect">
+            <a:avLst/>
+          </a:prstGeom>
+          <a:solidFill>
+            <a:srgbClr val="C5D8F1"/>
+          </a:solidFill>
+          <a:ln cap="flat" cmpd="sng" w="25400">
+            <a:solidFill>
+              <a:srgbClr val="244061"/>
+            </a:solidFill>
+            <a:prstDash val="solid"/>
+            <a:round/>
+            <a:headEnd len="med" w="med" type="none"/>
+            <a:tailEnd len="med" w="med" type="none"/>
+          </a:ln>
+        </p:spPr>
+        <p:txBody>
+          <a:bodyPr anchorCtr="0" anchor="t" bIns="45700" lIns="91425" rIns="91425" wrap="square" tIns="45700">
+            <a:noAutofit/>
+          </a:bodyPr>
+          <a:lstStyle/>
+          <a:p>
+            <a:pPr indent="0" lvl="0" marL="0" marR="0" rtl="0" algn="l">
+              <a:spcBef>
+                <a:spcPts val="0"/>
+              </a:spcBef>
+              <a:buSzPct val="25000"/>
+              <a:buNone/>
+            </a:pPr>
+            <a:r>
+              <a:rPr b="0" i="0" lang="en-AU" sz="2400" u="none" cap="none" strike="noStrike">
+                <a:solidFill>
+                  <a:schemeClr val="dk1"/>
+                </a:solidFill>
+                <a:latin typeface="Calibri"/>
+                <a:ea typeface="Calibri"/>
+                <a:cs typeface="Calibri"/>
+                <a:sym typeface="Calibri"/>
+              </a:rPr>
+              <a:t>As a</a:t>
+            </a:r>
+            <a:r>
+              <a:rPr lang="en-AU" sz="2400">
+                <a:solidFill>
+                  <a:schemeClr val="dk1"/>
+                </a:solidFill>
+                <a:latin typeface="Calibri"/>
+                <a:ea typeface="Calibri"/>
+                <a:cs typeface="Calibri"/>
+                <a:sym typeface="Calibri"/>
+              </a:rPr>
+              <a:t> user, I should be able to get similar information about other cities so that I can travel the country</a:t>
+            </a:r>
+          </a:p>
+        </p:txBody>
+      </p:sp>
+      <p:sp>
+        <p:nvSpPr>
+          <p:cNvPr id="255" name="Shape 255"/>
+          <p:cNvSpPr/>
+          <p:nvPr/>
+        </p:nvSpPr>
+        <p:spPr>
+          <a:xfrm>
+            <a:off x="39153" y="3335530"/>
+            <a:ext cx="9828000" cy="1620000"/>
+          </a:xfrm>
+          <a:prstGeom prst="rect">
+            <a:avLst/>
+          </a:prstGeom>
+          <a:solidFill>
+            <a:srgbClr val="DAE5F1"/>
+          </a:solidFill>
+          <a:ln cap="flat" cmpd="sng" w="25400">
+            <a:solidFill>
+              <a:srgbClr val="244061"/>
+            </a:solidFill>
+            <a:prstDash val="solid"/>
+            <a:round/>
+            <a:headEnd len="med" w="med" type="none"/>
+            <a:tailEnd len="med" w="med" type="none"/>
+          </a:ln>
+        </p:spPr>
+        <p:txBody>
+          <a:bodyPr anchorCtr="0" anchor="t" bIns="45700" lIns="91425" rIns="91425" wrap="square" tIns="36000">
+            <a:noAutofit/>
+          </a:bodyPr>
+          <a:lstStyle/>
+          <a:p>
+            <a:pPr indent="0" lvl="0" marL="0" marR="0" rtl="0" algn="l">
+              <a:spcBef>
+                <a:spcPts val="0"/>
+              </a:spcBef>
+              <a:buSzPct val="25000"/>
+              <a:buNone/>
+            </a:pPr>
+            <a:r>
+              <a:rPr lang="en-AU" sz="2000">
+                <a:solidFill>
+                  <a:schemeClr val="dk1"/>
+                </a:solidFill>
+                <a:latin typeface="Calibri"/>
+                <a:ea typeface="Calibri"/>
+                <a:cs typeface="Calibri"/>
+                <a:sym typeface="Calibri"/>
+              </a:rPr>
+              <a:t>Acceptance Criteria</a:t>
+            </a:r>
+          </a:p>
+          <a:p>
+            <a:pPr indent="-179387" lvl="0" marL="179387" marR="0" rtl="0" algn="l">
+              <a:spcBef>
+                <a:spcPts val="0"/>
+              </a:spcBef>
+              <a:buClr>
+                <a:schemeClr val="dk1"/>
+              </a:buClr>
+              <a:buSzPct val="100000"/>
+              <a:buFont typeface="Calibri"/>
+              <a:buChar char="•"/>
+            </a:pPr>
+            <a:r>
+              <a:rPr lang="en-AU" sz="2000">
+                <a:solidFill>
+                  <a:schemeClr val="dk1"/>
+                </a:solidFill>
+                <a:latin typeface="Calibri"/>
+                <a:ea typeface="Calibri"/>
+                <a:cs typeface="Calibri"/>
+                <a:sym typeface="Calibri"/>
+              </a:rPr>
+              <a:t>Includes all information on any cities in Australia</a:t>
+            </a:r>
+          </a:p>
+          <a:p>
+            <a:pPr indent="-179387" lvl="0" marL="179387" marR="0" rtl="0" algn="l">
+              <a:spcBef>
+                <a:spcPts val="0"/>
+              </a:spcBef>
+              <a:buClr>
+                <a:schemeClr val="dk1"/>
+              </a:buClr>
+              <a:buSzPct val="100000"/>
+              <a:buFont typeface="Calibri"/>
+              <a:buChar char="•"/>
+            </a:pPr>
+            <a:r>
+              <a:rPr lang="en-AU" sz="2000">
+                <a:solidFill>
+                  <a:schemeClr val="dk1"/>
+                </a:solidFill>
+                <a:latin typeface="Calibri"/>
+                <a:ea typeface="Calibri"/>
+                <a:cs typeface="Calibri"/>
+                <a:sym typeface="Calibri"/>
+              </a:rPr>
+              <a:t>Data or information presented in the same format as with “Discover Brisbane”</a:t>
+            </a:r>
+          </a:p>
+        </p:txBody>
+      </p:sp>
+      <p:sp>
+        <p:nvSpPr>
+          <p:cNvPr id="256" name="Shape 256"/>
+          <p:cNvSpPr/>
+          <p:nvPr/>
+        </p:nvSpPr>
+        <p:spPr>
+          <a:xfrm>
+            <a:off x="9147153" y="109410"/>
+            <a:ext cx="720000" cy="540000"/>
+          </a:xfrm>
+          <a:prstGeom prst="rect">
+            <a:avLst/>
+          </a:prstGeom>
+          <a:solidFill>
+            <a:srgbClr val="CCF0CD">
+              <a:alpha val="20000"/>
+            </a:srgbClr>
+          </a:solidFill>
+          <a:ln cap="flat" cmpd="sng" w="25400">
+            <a:solidFill>
+              <a:srgbClr val="244061"/>
+            </a:solidFill>
+            <a:prstDash val="solid"/>
+            <a:round/>
+            <a:headEnd len="med" w="med" type="none"/>
+            <a:tailEnd len="med" w="med" type="none"/>
+          </a:ln>
+        </p:spPr>
+        <p:txBody>
+          <a:bodyPr anchorCtr="0" anchor="ctr" bIns="45700" lIns="0" rIns="0" wrap="square" tIns="45700">
+            <a:noAutofit/>
+          </a:bodyPr>
+          <a:lstStyle/>
+          <a:p>
+            <a:pPr indent="0" lvl="0" marL="0" marR="0" rtl="0" algn="ctr">
+              <a:spcBef>
+                <a:spcPts val="0"/>
+              </a:spcBef>
+              <a:buSzPct val="25000"/>
+              <a:buNone/>
+            </a:pPr>
+            <a:r>
+              <a:rPr lang="en-AU" sz="1200">
+                <a:solidFill>
+                  <a:schemeClr val="dk1"/>
+                </a:solidFill>
+                <a:latin typeface="Calibri"/>
+                <a:ea typeface="Calibri"/>
+                <a:cs typeface="Calibri"/>
+                <a:sym typeface="Calibri"/>
+              </a:rPr>
+              <a:t>Story Points: 2</a:t>
+            </a:r>
+          </a:p>
+        </p:txBody>
+      </p:sp>
+      <p:sp>
+        <p:nvSpPr>
+          <p:cNvPr id="257" name="Shape 257"/>
           <p:cNvSpPr/>
           <p:nvPr/>
         </p:nvSpPr>
@@ -19752,7 +20458,7 @@
             <a:r>
               <a:rPr lang="en-AU" sz="2000">
                 <a:solidFill>
-                  <a:schemeClr val="dk1"/>
+                  <a:srgbClr val="38761D"/>
                 </a:solidFill>
                 <a:latin typeface="Calibri"/>
                 <a:ea typeface="Calibri"/>
@@ -19807,26 +20513,26 @@
             <a:r>
               <a:rPr b="0" i="0" lang="en-AU" sz="2000" u="none" cap="none" strike="noStrike">
                 <a:solidFill>
-                  <a:schemeClr val="dk1"/>
-                </a:solidFill>
-                <a:latin typeface="Calibri"/>
-                <a:ea typeface="Calibri"/>
-                <a:cs typeface="Calibri"/>
-                <a:sym typeface="Calibri"/>
-              </a:rPr>
-              <a:t>Story ID S</a:t>
+                  <a:srgbClr val="38761D"/>
+                </a:solidFill>
+                <a:latin typeface="Calibri"/>
+                <a:ea typeface="Calibri"/>
+                <a:cs typeface="Calibri"/>
+                <a:sym typeface="Calibri"/>
+              </a:rPr>
+              <a:t>Story ID </a:t>
             </a:r>
             <a:r>
               <a:rPr lang="en-AU" sz="2000">
                 <a:solidFill>
-                  <a:schemeClr val="dk1"/>
-                </a:solidFill>
-                <a:latin typeface="Calibri"/>
-                <a:ea typeface="Calibri"/>
-                <a:cs typeface="Calibri"/>
-                <a:sym typeface="Calibri"/>
-              </a:rPr>
-              <a:t>1</a:t>
+                  <a:srgbClr val="38761D"/>
+                </a:solidFill>
+                <a:latin typeface="Calibri"/>
+                <a:ea typeface="Calibri"/>
+                <a:cs typeface="Calibri"/>
+                <a:sym typeface="Calibri"/>
+              </a:rPr>
+              <a:t>U7</a:t>
             </a:r>
           </a:p>
         </p:txBody>
@@ -19840,7 +20546,7 @@
         <p:spPr>
           <a:xfrm>
             <a:off x="831150" y="109400"/>
-            <a:ext cx="6623100" cy="540000"/>
+            <a:ext cx="6636900" cy="540000"/>
           </a:xfrm>
           <a:prstGeom prst="rect">
             <a:avLst/>
@@ -19874,14 +20580,14 @@
             <a:r>
               <a:rPr lang="en-AU" sz="2800">
                 <a:solidFill>
-                  <a:schemeClr val="lt1"/>
-                </a:solidFill>
-                <a:latin typeface="Calibri"/>
-                <a:ea typeface="Calibri"/>
-                <a:cs typeface="Calibri"/>
-                <a:sym typeface="Calibri"/>
-              </a:rPr>
-              <a:t>Home page</a:t>
+                  <a:srgbClr val="38761D"/>
+                </a:solidFill>
+                <a:latin typeface="Calibri"/>
+                <a:ea typeface="Calibri"/>
+                <a:cs typeface="Calibri"/>
+                <a:sym typeface="Calibri"/>
+              </a:rPr>
+              <a:t>Category lists of locations</a:t>
             </a:r>
           </a:p>
         </p:txBody>
@@ -19894,8 +20600,8 @@
         </p:nvSpPr>
         <p:spPr>
           <a:xfrm>
-            <a:off x="39153" y="822470"/>
-            <a:ext cx="9828000" cy="2340000"/>
+            <a:off x="39150" y="822477"/>
+            <a:ext cx="9828000" cy="1894200"/>
           </a:xfrm>
           <a:prstGeom prst="rect">
             <a:avLst/>
@@ -19929,74 +20635,74 @@
             <a:r>
               <a:rPr b="0" i="0" lang="en-AU" sz="2400" u="none" cap="none" strike="noStrike">
                 <a:solidFill>
-                  <a:schemeClr val="dk1"/>
-                </a:solidFill>
-                <a:latin typeface="Calibri"/>
-                <a:ea typeface="Calibri"/>
-                <a:cs typeface="Calibri"/>
-                <a:sym typeface="Calibri"/>
-              </a:rPr>
-              <a:t>As a user, the home page to the website should </a:t>
+                  <a:srgbClr val="38761D"/>
+                </a:solidFill>
+                <a:latin typeface="Calibri"/>
+                <a:ea typeface="Calibri"/>
+                <a:cs typeface="Calibri"/>
+                <a:sym typeface="Calibri"/>
+              </a:rPr>
+              <a:t>As a user, </a:t>
             </a:r>
             <a:r>
               <a:rPr lang="en-AU" sz="2400">
                 <a:solidFill>
-                  <a:schemeClr val="dk1"/>
-                </a:solidFill>
-                <a:latin typeface="Calibri"/>
-                <a:ea typeface="Calibri"/>
-                <a:cs typeface="Calibri"/>
-                <a:sym typeface="Calibri"/>
-              </a:rPr>
-              <a:t>display relevant information </a:t>
+                  <a:srgbClr val="38761D"/>
+                </a:solidFill>
+                <a:latin typeface="Calibri"/>
+                <a:ea typeface="Calibri"/>
+                <a:cs typeface="Calibri"/>
+                <a:sym typeface="Calibri"/>
+              </a:rPr>
+              <a:t>I</a:t>
             </a:r>
             <a:r>
               <a:rPr b="0" i="0" lang="en-AU" sz="2400" u="none" cap="none" strike="noStrike">
                 <a:solidFill>
-                  <a:schemeClr val="dk1"/>
-                </a:solidFill>
-                <a:latin typeface="Calibri"/>
-                <a:ea typeface="Calibri"/>
-                <a:cs typeface="Calibri"/>
-                <a:sym typeface="Calibri"/>
-              </a:rPr>
-              <a:t>and </a:t>
+                  <a:srgbClr val="38761D"/>
+                </a:solidFill>
+                <a:latin typeface="Calibri"/>
+                <a:ea typeface="Calibri"/>
+                <a:cs typeface="Calibri"/>
+                <a:sym typeface="Calibri"/>
+              </a:rPr>
+              <a:t> want to be able</a:t>
             </a:r>
             <a:r>
               <a:rPr lang="en-AU" sz="2400">
                 <a:solidFill>
-                  <a:schemeClr val="dk1"/>
-                </a:solidFill>
-                <a:latin typeface="Calibri"/>
-                <a:ea typeface="Calibri"/>
-                <a:cs typeface="Calibri"/>
-                <a:sym typeface="Calibri"/>
-              </a:rPr>
-              <a:t>is u</a:t>
+                  <a:srgbClr val="38761D"/>
+                </a:solidFill>
+                <a:latin typeface="Calibri"/>
+                <a:ea typeface="Calibri"/>
+                <a:cs typeface="Calibri"/>
+                <a:sym typeface="Calibri"/>
+              </a:rPr>
+              <a:t> to get a complete list of locations depending on category selected s</a:t>
             </a:r>
             <a:r>
               <a:rPr b="0" i="0" lang="en-AU" sz="2400" u="none" cap="none" strike="noStrike">
                 <a:solidFill>
-                  <a:schemeClr val="dk1"/>
-                </a:solidFill>
-                <a:latin typeface="Calibri"/>
-                <a:ea typeface="Calibri"/>
-                <a:cs typeface="Calibri"/>
-                <a:sym typeface="Calibri"/>
-              </a:rPr>
-              <a:t>ser friendly so that </a:t>
+                  <a:srgbClr val="38761D"/>
+                </a:solidFill>
+                <a:latin typeface="Calibri"/>
+                <a:ea typeface="Calibri"/>
+                <a:cs typeface="Calibri"/>
+                <a:sym typeface="Calibri"/>
+              </a:rPr>
+              <a:t>o that</a:t>
             </a:r>
             <a:r>
               <a:rPr lang="en-AU" sz="2400">
                 <a:solidFill>
-                  <a:schemeClr val="dk1"/>
-                </a:solidFill>
-                <a:latin typeface="Calibri"/>
-                <a:ea typeface="Calibri"/>
-                <a:cs typeface="Calibri"/>
-                <a:sym typeface="Calibri"/>
-              </a:rPr>
-              <a:t>I can navigate through the web page</a:t>
+                  <a:srgbClr val="38761D"/>
+                </a:solidFill>
+                <a:latin typeface="Calibri"/>
+                <a:ea typeface="Calibri"/>
+                <a:cs typeface="Calibri"/>
+                <a:sym typeface="Calibri"/>
+              </a:rPr>
+              <a:t> I can browse through them</a:t>
             </a:r>
           </a:p>
         </p:txBody>
@@ -20009,8 +20715,8 @@
         </p:nvSpPr>
         <p:spPr>
           <a:xfrm>
-            <a:off x="39153" y="3335530"/>
-            <a:ext cx="9828000" cy="1620000"/>
+            <a:off x="39150" y="2816100"/>
+            <a:ext cx="9828000" cy="2700300"/>
           </a:xfrm>
           <a:prstGeom prst="rect">
             <a:avLst/>
@@ -20020,7 +20726,7 @@
           </a:solidFill>
           <a:ln cap="flat" cmpd="sng" w="25400">
             <a:solidFill>
-              <a:srgbClr val="000000"/>
+              <a:srgbClr val="244061"/>
             </a:solidFill>
             <a:prstDash val="solid"/>
             <a:round/>
@@ -20044,7 +20750,7 @@
             <a:r>
               <a:rPr lang="en-AU" sz="2000">
                 <a:solidFill>
-                  <a:schemeClr val="dk1"/>
+                  <a:srgbClr val="38761D"/>
                 </a:solidFill>
                 <a:latin typeface="Calibri"/>
                 <a:ea typeface="Calibri"/>
@@ -20055,12 +20761,37 @@
             </a:r>
           </a:p>
           <a:p>
-            <a:pPr indent="-179387" lvl="0" marL="179387" marR="0" rtl="0" algn="l">
-              <a:spcBef>
-                <a:spcPts val="0"/>
-              </a:spcBef>
-              <a:buClr>
-                <a:schemeClr val="dk1"/>
+            <a:pPr indent="-179387" lvl="0" marL="179387" rtl="0">
+              <a:spcBef>
+                <a:spcPts val="0"/>
+              </a:spcBef>
+              <a:buClr>
+                <a:srgbClr val="38761D"/>
+              </a:buClr>
+              <a:buSzPct val="100000"/>
+              <a:buFont typeface="Arial"/>
+              <a:buChar char="•"/>
+            </a:pPr>
+            <a:r>
+              <a:rPr lang="en-AU" sz="2000">
+                <a:solidFill>
+                  <a:srgbClr val="38761D"/>
+                </a:solidFill>
+                <a:latin typeface="Calibri"/>
+                <a:ea typeface="Calibri"/>
+                <a:cs typeface="Calibri"/>
+                <a:sym typeface="Calibri"/>
+              </a:rPr>
+              <a:t>Ensure webpage design is professional and aesthetically pleasing (consistent with main homepage design) </a:t>
+            </a:r>
+          </a:p>
+          <a:p>
+            <a:pPr indent="-179387" lvl="0" marL="179387" rtl="0">
+              <a:spcBef>
+                <a:spcPts val="0"/>
+              </a:spcBef>
+              <a:buClr>
+                <a:srgbClr val="38761D"/>
               </a:buClr>
               <a:buSzPct val="100000"/>
               <a:buFont typeface="Calibri"/>
@@ -20069,14 +20800,14 @@
             <a:r>
               <a:rPr lang="en-AU" sz="2000">
                 <a:solidFill>
-                  <a:schemeClr val="dk1"/>
-                </a:solidFill>
-                <a:latin typeface="Calibri"/>
-                <a:ea typeface="Calibri"/>
-                <a:cs typeface="Calibri"/>
-                <a:sym typeface="Calibri"/>
-              </a:rPr>
-              <a:t>Button to create new account</a:t>
+                  <a:srgbClr val="38761D"/>
+                </a:solidFill>
+                <a:latin typeface="Calibri"/>
+                <a:ea typeface="Calibri"/>
+                <a:cs typeface="Calibri"/>
+                <a:sym typeface="Calibri"/>
+              </a:rPr>
+              <a:t>Reuse code for retrieving location result from database across all categories</a:t>
             </a:r>
           </a:p>
           <a:p>
@@ -20085,7 +20816,7 @@
                 <a:spcPts val="0"/>
               </a:spcBef>
               <a:buClr>
-                <a:schemeClr val="dk1"/>
+                <a:srgbClr val="38761D"/>
               </a:buClr>
               <a:buSzPct val="100000"/>
               <a:buFont typeface="Calibri"/>
@@ -20093,12 +20824,15 @@
             </a:pPr>
             <a:r>
               <a:rPr lang="en-AU" sz="2000">
-                <a:latin typeface="Calibri"/>
-                <a:ea typeface="Calibri"/>
-                <a:cs typeface="Calibri"/>
-                <a:sym typeface="Calibri"/>
-              </a:rPr>
-              <a:t>All categories of information presented in tiled format</a:t>
+                <a:solidFill>
+                  <a:srgbClr val="38761D"/>
+                </a:solidFill>
+                <a:latin typeface="Calibri"/>
+                <a:ea typeface="Calibri"/>
+                <a:cs typeface="Calibri"/>
+                <a:sym typeface="Calibri"/>
+              </a:rPr>
+              <a:t>Ensure all information presented are relevant to category selected</a:t>
             </a:r>
           </a:p>
         </p:txBody>
@@ -20148,14 +20882,14 @@
             <a:r>
               <a:rPr lang="en-AU" sz="1200">
                 <a:solidFill>
-                  <a:schemeClr val="dk1"/>
-                </a:solidFill>
-                <a:latin typeface="Calibri"/>
-                <a:ea typeface="Calibri"/>
-                <a:cs typeface="Calibri"/>
-                <a:sym typeface="Calibri"/>
-              </a:rPr>
-              <a:t>Story Points: 2</a:t>
+                  <a:srgbClr val="38761D"/>
+                </a:solidFill>
+                <a:latin typeface="Calibri"/>
+                <a:ea typeface="Calibri"/>
+                <a:cs typeface="Calibri"/>
+                <a:sym typeface="Calibri"/>
+              </a:rPr>
+              <a:t>Story Points: 3</a:t>
             </a:r>
           </a:p>
         </p:txBody>
@@ -20168,8 +20902,8 @@
         </p:nvSpPr>
         <p:spPr>
           <a:xfrm>
-            <a:off x="39153" y="5128590"/>
-            <a:ext cx="9828000" cy="1620000"/>
+            <a:off x="39150" y="5715000"/>
+            <a:ext cx="9828000" cy="1033200"/>
           </a:xfrm>
           <a:prstGeom prst="rect">
             <a:avLst/>
@@ -20203,7 +20937,7 @@
             <a:r>
               <a:rPr lang="en-AU" sz="2000">
                 <a:solidFill>
-                  <a:schemeClr val="dk1"/>
+                  <a:srgbClr val="38761D"/>
                 </a:solidFill>
                 <a:latin typeface="Calibri"/>
                 <a:ea typeface="Calibri"/>
@@ -20211,81 +20945,6 @@
                 <a:sym typeface="Calibri"/>
               </a:rPr>
               <a:t>Notes</a:t>
-            </a:r>
-          </a:p>
-          <a:p>
-            <a:pPr indent="-179387" lvl="0" marL="179387" marR="0" rtl="0" algn="l">
-              <a:spcBef>
-                <a:spcPts val="0"/>
-              </a:spcBef>
-              <a:buClr>
-                <a:schemeClr val="dk1"/>
-              </a:buClr>
-              <a:buSzPct val="100000"/>
-              <a:buFont typeface="Arial"/>
-              <a:buChar char="•"/>
-            </a:pPr>
-            <a:r>
-              <a:rPr lang="en-AU" sz="2000">
-                <a:solidFill>
-                  <a:schemeClr val="dk1"/>
-                </a:solidFill>
-                <a:latin typeface="Calibri"/>
-                <a:ea typeface="Calibri"/>
-                <a:cs typeface="Calibri"/>
-                <a:sym typeface="Calibri"/>
-              </a:rPr>
-              <a:t> Amazing design</a:t>
-            </a:r>
-          </a:p>
-          <a:p>
-            <a:pPr indent="-179387" lvl="0" marL="179387" marR="0" rtl="0" algn="l">
-              <a:spcBef>
-                <a:spcPts val="0"/>
-              </a:spcBef>
-              <a:buClr>
-                <a:schemeClr val="dk1"/>
-              </a:buClr>
-              <a:buSzPct val="100000"/>
-              <a:buFont typeface="Calibri"/>
-              <a:buChar char="•"/>
-            </a:pPr>
-            <a:r>
-              <a:rPr lang="en-AU" sz="2000">
-                <a:solidFill>
-                  <a:schemeClr val="dk1"/>
-                </a:solidFill>
-                <a:latin typeface="Calibri"/>
-                <a:ea typeface="Calibri"/>
-                <a:cs typeface="Calibri"/>
-                <a:sym typeface="Calibri"/>
-              </a:rPr>
-              <a:t>Logo</a:t>
-            </a:r>
-          </a:p>
-          <a:p>
-            <a:pPr indent="-179387" lvl="0" marL="179387" rtl="0">
-              <a:spcBef>
-                <a:spcPts val="0"/>
-              </a:spcBef>
-              <a:buClr>
-                <a:schemeClr val="dk1"/>
-              </a:buClr>
-              <a:buSzPct val="100000"/>
-              <a:buFont typeface="Calibri"/>
-              <a:buChar char="•"/>
-            </a:pPr>
-            <a:r>
-              <a:rPr lang="en-AU" sz="2000">
-                <a:solidFill>
-                  <a:schemeClr val="dk1"/>
-                </a:solidFill>
-                <a:latin typeface="Calibri"/>
-                <a:ea typeface="Calibri"/>
-                <a:cs typeface="Calibri"/>
-                <a:sym typeface="Calibri"/>
-              </a:rPr>
-              <a:t>Aesthetically pleasing to the eyes (font, colour, attractiveness)</a:t>
             </a:r>
           </a:p>
         </p:txBody>

</xml_diff>